<commit_message>
Adding explanation about Particle Filter
</commit_message>
<xml_diff>
--- a/Presentation/DL_project_presentation.pptx
+++ b/Presentation/DL_project_presentation.pptx
@@ -6,7 +6,7 @@
     <p:sldMasterId id="2147483684" r:id="rId2"/>
   </p:sldMasterIdLst>
   <p:notesMasterIdLst>
-    <p:notesMasterId r:id="rId18"/>
+    <p:notesMasterId r:id="rId24"/>
   </p:notesMasterIdLst>
   <p:sldIdLst>
     <p:sldId id="256" r:id="rId3"/>
@@ -16,14 +16,20 @@
     <p:sldId id="289" r:id="rId7"/>
     <p:sldId id="291" r:id="rId8"/>
     <p:sldId id="292" r:id="rId9"/>
-    <p:sldId id="290" r:id="rId10"/>
+    <p:sldId id="310" r:id="rId10"/>
     <p:sldId id="295" r:id="rId11"/>
     <p:sldId id="299" r:id="rId12"/>
     <p:sldId id="296" r:id="rId13"/>
     <p:sldId id="298" r:id="rId14"/>
     <p:sldId id="300" r:id="rId15"/>
     <p:sldId id="301" r:id="rId16"/>
-    <p:sldId id="297" r:id="rId17"/>
+    <p:sldId id="302" r:id="rId17"/>
+    <p:sldId id="303" r:id="rId18"/>
+    <p:sldId id="306" r:id="rId19"/>
+    <p:sldId id="304" r:id="rId20"/>
+    <p:sldId id="307" r:id="rId21"/>
+    <p:sldId id="308" r:id="rId22"/>
+    <p:sldId id="297" r:id="rId23"/>
   </p:sldIdLst>
   <p:sldSz cx="12192000" cy="6858000"/>
   <p:notesSz cx="6858000" cy="9144000"/>
@@ -964,7 +970,175 @@
           <a:p>
             <a:fld id="{BB072CD4-8151-4317-B517-71349F960F6F}" type="slidenum">
               <a:rPr lang="en-US" smtClean="0"/>
-              <a:t>15</a:t>
+              <a:t>18</a:t>
+            </a:fld>
+            <a:endParaRPr lang="en-US"/>
+          </a:p>
+        </p:txBody>
+      </p:sp>
+    </p:spTree>
+    <p:extLst>
+      <p:ext uri="{BB962C8B-B14F-4D97-AF65-F5344CB8AC3E}">
+        <p14:creationId xmlns:p14="http://schemas.microsoft.com/office/powerpoint/2010/main" val="64296319"/>
+      </p:ext>
+    </p:extLst>
+  </p:cSld>
+  <p:clrMapOvr>
+    <a:masterClrMapping/>
+  </p:clrMapOvr>
+</p:notes>
+</file>
+
+<file path=ppt/notesSlides/notesSlide15.xml><?xml version="1.0" encoding="utf-8"?>
+<p:notes xmlns:a="http://schemas.openxmlformats.org/drawingml/2006/main" xmlns:r="http://schemas.openxmlformats.org/officeDocument/2006/relationships" xmlns:p="http://schemas.openxmlformats.org/presentationml/2006/main">
+  <p:cSld>
+    <p:spTree>
+      <p:nvGrpSpPr>
+        <p:cNvPr id="1" name=""/>
+        <p:cNvGrpSpPr/>
+        <p:nvPr/>
+      </p:nvGrpSpPr>
+      <p:grpSpPr>
+        <a:xfrm>
+          <a:off x="0" y="0"/>
+          <a:ext cx="0" cy="0"/>
+          <a:chOff x="0" y="0"/>
+          <a:chExt cx="0" cy="0"/>
+        </a:xfrm>
+      </p:grpSpPr>
+      <p:sp>
+        <p:nvSpPr>
+          <p:cNvPr id="2" name="Slide Image Placeholder 1"/>
+          <p:cNvSpPr>
+            <a:spLocks noGrp="1" noRot="1" noChangeAspect="1"/>
+          </p:cNvSpPr>
+          <p:nvPr>
+            <p:ph type="sldImg"/>
+          </p:nvPr>
+        </p:nvSpPr>
+        <p:spPr/>
+      </p:sp>
+      <p:sp>
+        <p:nvSpPr>
+          <p:cNvPr id="3" name="Notes Placeholder 2"/>
+          <p:cNvSpPr>
+            <a:spLocks noGrp="1"/>
+          </p:cNvSpPr>
+          <p:nvPr>
+            <p:ph type="body" idx="1"/>
+          </p:nvPr>
+        </p:nvSpPr>
+        <p:spPr/>
+        <p:txBody>
+          <a:bodyPr/>
+          <a:lstStyle/>
+          <a:p>
+            <a:endParaRPr lang="en-US" dirty="0"/>
+          </a:p>
+        </p:txBody>
+      </p:sp>
+      <p:sp>
+        <p:nvSpPr>
+          <p:cNvPr id="4" name="Slide Number Placeholder 3"/>
+          <p:cNvSpPr>
+            <a:spLocks noGrp="1"/>
+          </p:cNvSpPr>
+          <p:nvPr>
+            <p:ph type="sldNum" sz="quarter" idx="5"/>
+          </p:nvPr>
+        </p:nvSpPr>
+        <p:spPr/>
+        <p:txBody>
+          <a:bodyPr/>
+          <a:lstStyle/>
+          <a:p>
+            <a:fld id="{BB072CD4-8151-4317-B517-71349F960F6F}" type="slidenum">
+              <a:rPr lang="en-US" smtClean="0"/>
+              <a:t>19</a:t>
+            </a:fld>
+            <a:endParaRPr lang="en-US"/>
+          </a:p>
+        </p:txBody>
+      </p:sp>
+    </p:spTree>
+    <p:extLst>
+      <p:ext uri="{BB962C8B-B14F-4D97-AF65-F5344CB8AC3E}">
+        <p14:creationId xmlns:p14="http://schemas.microsoft.com/office/powerpoint/2010/main" val="1322666829"/>
+      </p:ext>
+    </p:extLst>
+  </p:cSld>
+  <p:clrMapOvr>
+    <a:masterClrMapping/>
+  </p:clrMapOvr>
+</p:notes>
+</file>
+
+<file path=ppt/notesSlides/notesSlide16.xml><?xml version="1.0" encoding="utf-8"?>
+<p:notes xmlns:a="http://schemas.openxmlformats.org/drawingml/2006/main" xmlns:r="http://schemas.openxmlformats.org/officeDocument/2006/relationships" xmlns:p="http://schemas.openxmlformats.org/presentationml/2006/main">
+  <p:cSld>
+    <p:spTree>
+      <p:nvGrpSpPr>
+        <p:cNvPr id="1" name=""/>
+        <p:cNvGrpSpPr/>
+        <p:nvPr/>
+      </p:nvGrpSpPr>
+      <p:grpSpPr>
+        <a:xfrm>
+          <a:off x="0" y="0"/>
+          <a:ext cx="0" cy="0"/>
+          <a:chOff x="0" y="0"/>
+          <a:chExt cx="0" cy="0"/>
+        </a:xfrm>
+      </p:grpSpPr>
+      <p:sp>
+        <p:nvSpPr>
+          <p:cNvPr id="2" name="Slide Image Placeholder 1"/>
+          <p:cNvSpPr>
+            <a:spLocks noGrp="1" noRot="1" noChangeAspect="1"/>
+          </p:cNvSpPr>
+          <p:nvPr>
+            <p:ph type="sldImg"/>
+          </p:nvPr>
+        </p:nvSpPr>
+        <p:spPr/>
+      </p:sp>
+      <p:sp>
+        <p:nvSpPr>
+          <p:cNvPr id="3" name="Notes Placeholder 2"/>
+          <p:cNvSpPr>
+            <a:spLocks noGrp="1"/>
+          </p:cNvSpPr>
+          <p:nvPr>
+            <p:ph type="body" idx="1"/>
+          </p:nvPr>
+        </p:nvSpPr>
+        <p:spPr/>
+        <p:txBody>
+          <a:bodyPr/>
+          <a:lstStyle/>
+          <a:p>
+            <a:endParaRPr lang="en-US" dirty="0"/>
+          </a:p>
+        </p:txBody>
+      </p:sp>
+      <p:sp>
+        <p:nvSpPr>
+          <p:cNvPr id="4" name="Slide Number Placeholder 3"/>
+          <p:cNvSpPr>
+            <a:spLocks noGrp="1"/>
+          </p:cNvSpPr>
+          <p:nvPr>
+            <p:ph type="sldNum" sz="quarter" idx="5"/>
+          </p:nvPr>
+        </p:nvSpPr>
+        <p:spPr/>
+        <p:txBody>
+          <a:bodyPr/>
+          <a:lstStyle/>
+          <a:p>
+            <a:fld id="{BB072CD4-8151-4317-B517-71349F960F6F}" type="slidenum">
+              <a:rPr lang="en-US" smtClean="0"/>
+              <a:t>21</a:t>
             </a:fld>
             <a:endParaRPr lang="en-US"/>
           </a:p>
@@ -1363,7 +1537,10 @@
           <a:bodyPr/>
           <a:lstStyle/>
           <a:p>
-            <a:endParaRPr lang="en-US" dirty="0"/>
+            <a:r>
+              <a:rPr lang="en-US" dirty="0"/>
+              <a:t>Point out the Fine matching Stage</a:t>
+            </a:r>
           </a:p>
         </p:txBody>
       </p:sp>
@@ -1447,7 +1624,10 @@
           <a:bodyPr/>
           <a:lstStyle/>
           <a:p>
-            <a:endParaRPr lang="en-US" dirty="0"/>
+            <a:r>
+              <a:rPr lang="en-US" dirty="0"/>
+              <a:t>Point out the Fine matching Stage</a:t>
+            </a:r>
           </a:p>
         </p:txBody>
       </p:sp>
@@ -1477,7 +1657,7 @@
     </p:spTree>
     <p:extLst>
       <p:ext uri="{BB962C8B-B14F-4D97-AF65-F5344CB8AC3E}">
-        <p14:creationId xmlns:p14="http://schemas.microsoft.com/office/powerpoint/2010/main" val="875483981"/>
+        <p14:creationId xmlns:p14="http://schemas.microsoft.com/office/powerpoint/2010/main" val="611552048"/>
       </p:ext>
     </p:extLst>
   </p:cSld>
@@ -10488,40 +10668,10 @@
       </p:grpSpPr>
       <p:sp>
         <p:nvSpPr>
-          <p:cNvPr id="2" name="Title 1">
-            <a:extLst>
-              <a:ext uri="{FF2B5EF4-FFF2-40B4-BE49-F238E27FC236}">
-                <a16:creationId xmlns:a16="http://schemas.microsoft.com/office/drawing/2014/main" id="{143B5247-4B5C-44D2-AE13-25DD403557B4}"/>
-              </a:ext>
-            </a:extLst>
-          </p:cNvPr>
-          <p:cNvSpPr>
-            <a:spLocks noGrp="1"/>
-          </p:cNvSpPr>
-          <p:nvPr>
-            <p:ph type="title"/>
-          </p:nvPr>
-        </p:nvSpPr>
-        <p:spPr/>
-        <p:txBody>
-          <a:bodyPr>
-            <a:normAutofit/>
-          </a:bodyPr>
-          <a:lstStyle/>
-          <a:p>
-            <a:r>
-              <a:rPr lang="en-US" dirty="0"/>
-              <a:t>Questions?</a:t>
-            </a:r>
-          </a:p>
-        </p:txBody>
-      </p:sp>
-      <p:sp>
-        <p:nvSpPr>
-          <p:cNvPr id="4" name="Date Placeholder 3">
-            <a:extLst>
-              <a:ext uri="{FF2B5EF4-FFF2-40B4-BE49-F238E27FC236}">
-                <a16:creationId xmlns:a16="http://schemas.microsoft.com/office/drawing/2014/main" id="{59913B85-3B4F-43D3-A7E9-D06F5E37C6C1}"/>
+          <p:cNvPr id="2" name="Date Placeholder 1">
+            <a:extLst>
+              <a:ext uri="{FF2B5EF4-FFF2-40B4-BE49-F238E27FC236}">
+                <a16:creationId xmlns:a16="http://schemas.microsoft.com/office/drawing/2014/main" id="{17F4FCC4-4604-40D1-9F16-F88324ED8F57}"/>
               </a:ext>
             </a:extLst>
           </p:cNvPr>
@@ -10547,10 +10697,10 @@
       </p:sp>
       <p:sp>
         <p:nvSpPr>
-          <p:cNvPr id="5" name="Footer Placeholder 4">
-            <a:extLst>
-              <a:ext uri="{FF2B5EF4-FFF2-40B4-BE49-F238E27FC236}">
-                <a16:creationId xmlns:a16="http://schemas.microsoft.com/office/drawing/2014/main" id="{C5649577-8229-4DC9-AE82-59C3A5BA0515}"/>
+          <p:cNvPr id="3" name="Footer Placeholder 2">
+            <a:extLst>
+              <a:ext uri="{FF2B5EF4-FFF2-40B4-BE49-F238E27FC236}">
+                <a16:creationId xmlns:a16="http://schemas.microsoft.com/office/drawing/2014/main" id="{390ECFB5-D86A-493C-BE04-56C46A03F928}"/>
               </a:ext>
             </a:extLst>
           </p:cNvPr>
@@ -10567,18 +10717,19 @@
           <a:lstStyle/>
           <a:p>
             <a:r>
-              <a:rPr lang="en-US" dirty="0"/>
+              <a:rPr lang="en-US"/>
               <a:t>Or Sagiv &amp; Etai Sella</a:t>
             </a:r>
-          </a:p>
-        </p:txBody>
-      </p:sp>
-      <p:sp>
-        <p:nvSpPr>
-          <p:cNvPr id="6" name="Slide Number Placeholder 5">
-            <a:extLst>
-              <a:ext uri="{FF2B5EF4-FFF2-40B4-BE49-F238E27FC236}">
-                <a16:creationId xmlns:a16="http://schemas.microsoft.com/office/drawing/2014/main" id="{1B57282B-C25D-48B2-A667-C1D467EB1137}"/>
+            <a:endParaRPr lang="en-US" dirty="0"/>
+          </a:p>
+        </p:txBody>
+      </p:sp>
+      <p:sp>
+        <p:nvSpPr>
+          <p:cNvPr id="4" name="Slide Number Placeholder 3">
+            <a:extLst>
+              <a:ext uri="{FF2B5EF4-FFF2-40B4-BE49-F238E27FC236}">
+                <a16:creationId xmlns:a16="http://schemas.microsoft.com/office/drawing/2014/main" id="{34B1658B-2A38-4339-AD04-15960337C0A3}"/>
               </a:ext>
             </a:extLst>
           </p:cNvPr>
@@ -10602,10 +10753,3154 @@
           </a:p>
         </p:txBody>
       </p:sp>
+      <p:sp>
+        <p:nvSpPr>
+          <p:cNvPr id="5" name="Content Placeholder 4">
+            <a:extLst>
+              <a:ext uri="{FF2B5EF4-FFF2-40B4-BE49-F238E27FC236}">
+                <a16:creationId xmlns:a16="http://schemas.microsoft.com/office/drawing/2014/main" id="{D692A99E-EB4E-41A4-A607-9B3A99A7979C}"/>
+              </a:ext>
+            </a:extLst>
+          </p:cNvPr>
+          <p:cNvSpPr>
+            <a:spLocks noGrp="1"/>
+          </p:cNvSpPr>
+          <p:nvPr>
+            <p:ph idx="1"/>
+          </p:nvPr>
+        </p:nvSpPr>
+        <p:spPr/>
+        <p:txBody>
+          <a:bodyPr/>
+          <a:lstStyle/>
+          <a:p>
+            <a:r>
+              <a:rPr lang="en-US" dirty="0"/>
+              <a:t>To test AR’s transferability and make use of its low latency we built our own custom tracker and applied AR to it.</a:t>
+            </a:r>
+          </a:p>
+          <a:p>
+            <a:endParaRPr lang="en-US" dirty="0"/>
+          </a:p>
+          <a:p>
+            <a:r>
+              <a:rPr lang="en-US" dirty="0"/>
+              <a:t>Our tracker is made up of two core components:</a:t>
+            </a:r>
+          </a:p>
+          <a:p>
+            <a:pPr marL="914400" lvl="1" indent="-457200">
+              <a:buAutoNum type="arabicParenR"/>
+            </a:pPr>
+            <a:r>
+              <a:rPr lang="en-US" dirty="0"/>
+              <a:t>Particle Filter</a:t>
+            </a:r>
+          </a:p>
+          <a:p>
+            <a:pPr marL="914400" lvl="1" indent="-457200">
+              <a:buAutoNum type="arabicParenR"/>
+            </a:pPr>
+            <a:r>
+              <a:rPr lang="en-US" dirty="0"/>
+              <a:t>“Edge Preserving” State Update</a:t>
+            </a:r>
+          </a:p>
+        </p:txBody>
+      </p:sp>
+      <p:sp>
+        <p:nvSpPr>
+          <p:cNvPr id="6" name="Title 5">
+            <a:extLst>
+              <a:ext uri="{FF2B5EF4-FFF2-40B4-BE49-F238E27FC236}">
+                <a16:creationId xmlns:a16="http://schemas.microsoft.com/office/drawing/2014/main" id="{E9E4C79A-08FA-4D88-949A-AE7B6340D376}"/>
+              </a:ext>
+            </a:extLst>
+          </p:cNvPr>
+          <p:cNvSpPr>
+            <a:spLocks noGrp="1"/>
+          </p:cNvSpPr>
+          <p:nvPr>
+            <p:ph type="title"/>
+          </p:nvPr>
+        </p:nvSpPr>
+        <p:spPr/>
+        <p:txBody>
+          <a:bodyPr/>
+          <a:lstStyle/>
+          <a:p>
+            <a:r>
+              <a:rPr lang="en-US" dirty="0"/>
+              <a:t>Our Addition – Particle Filter + AR</a:t>
+            </a:r>
+          </a:p>
+        </p:txBody>
+      </p:sp>
     </p:spTree>
     <p:extLst>
       <p:ext uri="{BB962C8B-B14F-4D97-AF65-F5344CB8AC3E}">
-        <p14:creationId xmlns:p14="http://schemas.microsoft.com/office/powerpoint/2010/main" val="3084981542"/>
+        <p14:creationId xmlns:p14="http://schemas.microsoft.com/office/powerpoint/2010/main" val="204841130"/>
+      </p:ext>
+    </p:extLst>
+  </p:cSld>
+  <p:clrMapOvr>
+    <a:masterClrMapping/>
+  </p:clrMapOvr>
+</p:sld>
+</file>
+
+<file path=ppt/slides/slide16.xml><?xml version="1.0" encoding="utf-8"?>
+<p:sld xmlns:a="http://schemas.openxmlformats.org/drawingml/2006/main" xmlns:r="http://schemas.openxmlformats.org/officeDocument/2006/relationships" xmlns:p="http://schemas.openxmlformats.org/presentationml/2006/main">
+  <p:cSld>
+    <p:spTree>
+      <p:nvGrpSpPr>
+        <p:cNvPr id="1" name=""/>
+        <p:cNvGrpSpPr/>
+        <p:nvPr/>
+      </p:nvGrpSpPr>
+      <p:grpSpPr>
+        <a:xfrm>
+          <a:off x="0" y="0"/>
+          <a:ext cx="0" cy="0"/>
+          <a:chOff x="0" y="0"/>
+          <a:chExt cx="0" cy="0"/>
+        </a:xfrm>
+      </p:grpSpPr>
+      <p:sp>
+        <p:nvSpPr>
+          <p:cNvPr id="2" name="Date Placeholder 1">
+            <a:extLst>
+              <a:ext uri="{FF2B5EF4-FFF2-40B4-BE49-F238E27FC236}">
+                <a16:creationId xmlns:a16="http://schemas.microsoft.com/office/drawing/2014/main" id="{17F4FCC4-4604-40D1-9F16-F88324ED8F57}"/>
+              </a:ext>
+            </a:extLst>
+          </p:cNvPr>
+          <p:cNvSpPr>
+            <a:spLocks noGrp="1"/>
+          </p:cNvSpPr>
+          <p:nvPr>
+            <p:ph type="dt" sz="half" idx="10"/>
+          </p:nvPr>
+        </p:nvSpPr>
+        <p:spPr/>
+        <p:txBody>
+          <a:bodyPr/>
+          <a:lstStyle/>
+          <a:p>
+            <a:fld id="{F736EC4A-E5B7-42C2-9943-4D2477F0E2BA}" type="datetime1">
+              <a:rPr lang="en-US" smtClean="0"/>
+              <a:t>2/16/2022</a:t>
+            </a:fld>
+            <a:endParaRPr lang="en-US" dirty="0"/>
+          </a:p>
+        </p:txBody>
+      </p:sp>
+      <p:sp>
+        <p:nvSpPr>
+          <p:cNvPr id="3" name="Footer Placeholder 2">
+            <a:extLst>
+              <a:ext uri="{FF2B5EF4-FFF2-40B4-BE49-F238E27FC236}">
+                <a16:creationId xmlns:a16="http://schemas.microsoft.com/office/drawing/2014/main" id="{390ECFB5-D86A-493C-BE04-56C46A03F928}"/>
+              </a:ext>
+            </a:extLst>
+          </p:cNvPr>
+          <p:cNvSpPr>
+            <a:spLocks noGrp="1"/>
+          </p:cNvSpPr>
+          <p:nvPr>
+            <p:ph type="ftr" sz="quarter" idx="11"/>
+          </p:nvPr>
+        </p:nvSpPr>
+        <p:spPr/>
+        <p:txBody>
+          <a:bodyPr/>
+          <a:lstStyle/>
+          <a:p>
+            <a:r>
+              <a:rPr lang="en-US"/>
+              <a:t>Or Sagiv &amp; Etai Sella</a:t>
+            </a:r>
+            <a:endParaRPr lang="en-US" dirty="0"/>
+          </a:p>
+        </p:txBody>
+      </p:sp>
+      <p:sp>
+        <p:nvSpPr>
+          <p:cNvPr id="4" name="Slide Number Placeholder 3">
+            <a:extLst>
+              <a:ext uri="{FF2B5EF4-FFF2-40B4-BE49-F238E27FC236}">
+                <a16:creationId xmlns:a16="http://schemas.microsoft.com/office/drawing/2014/main" id="{34B1658B-2A38-4339-AD04-15960337C0A3}"/>
+              </a:ext>
+            </a:extLst>
+          </p:cNvPr>
+          <p:cNvSpPr>
+            <a:spLocks noGrp="1"/>
+          </p:cNvSpPr>
+          <p:nvPr>
+            <p:ph type="sldNum" sz="quarter" idx="12"/>
+          </p:nvPr>
+        </p:nvSpPr>
+        <p:spPr/>
+        <p:txBody>
+          <a:bodyPr/>
+          <a:lstStyle/>
+          <a:p>
+            <a:fld id="{C629165E-D59B-453D-B763-34340D7036F6}" type="slidenum">
+              <a:rPr lang="en-US" smtClean="0"/>
+              <a:t>16</a:t>
+            </a:fld>
+            <a:endParaRPr lang="en-US" dirty="0"/>
+          </a:p>
+        </p:txBody>
+      </p:sp>
+      <p:sp>
+        <p:nvSpPr>
+          <p:cNvPr id="5" name="Content Placeholder 4">
+            <a:extLst>
+              <a:ext uri="{FF2B5EF4-FFF2-40B4-BE49-F238E27FC236}">
+                <a16:creationId xmlns:a16="http://schemas.microsoft.com/office/drawing/2014/main" id="{D692A99E-EB4E-41A4-A607-9B3A99A7979C}"/>
+              </a:ext>
+            </a:extLst>
+          </p:cNvPr>
+          <p:cNvSpPr>
+            <a:spLocks noGrp="1"/>
+          </p:cNvSpPr>
+          <p:nvPr>
+            <p:ph idx="1"/>
+          </p:nvPr>
+        </p:nvSpPr>
+        <p:spPr/>
+        <p:txBody>
+          <a:bodyPr>
+            <a:normAutofit fontScale="92500" lnSpcReduction="10000"/>
+          </a:bodyPr>
+          <a:lstStyle/>
+          <a:p>
+            <a:r>
+              <a:rPr lang="en-US" dirty="0"/>
+              <a:t>Particle filter is a technique for estimating the state of a dynamic system</a:t>
+            </a:r>
+          </a:p>
+          <a:p>
+            <a:endParaRPr lang="en-US" dirty="0"/>
+          </a:p>
+          <a:p>
+            <a:r>
+              <a:rPr lang="en-US" dirty="0"/>
+              <a:t>It is based making multiple guesses about the system’s state – </a:t>
+            </a:r>
+            <a:r>
+              <a:rPr lang="en-US" b="1" dirty="0"/>
+              <a:t>particles</a:t>
+            </a:r>
+          </a:p>
+          <a:p>
+            <a:endParaRPr lang="en-US" b="1" dirty="0"/>
+          </a:p>
+          <a:p>
+            <a:r>
+              <a:rPr lang="en-US" dirty="0"/>
+              <a:t>At each step the guesses are evaluated and updated according to former particles </a:t>
+            </a:r>
+          </a:p>
+          <a:p>
+            <a:endParaRPr lang="en-US" dirty="0"/>
+          </a:p>
+          <a:p>
+            <a:r>
+              <a:rPr lang="en-US" dirty="0"/>
+              <a:t>Particles which agree with observations get more weight, and have a bigger effect on future particles</a:t>
+            </a:r>
+          </a:p>
+        </p:txBody>
+      </p:sp>
+      <p:sp>
+        <p:nvSpPr>
+          <p:cNvPr id="6" name="Title 5">
+            <a:extLst>
+              <a:ext uri="{FF2B5EF4-FFF2-40B4-BE49-F238E27FC236}">
+                <a16:creationId xmlns:a16="http://schemas.microsoft.com/office/drawing/2014/main" id="{E9E4C79A-08FA-4D88-949A-AE7B6340D376}"/>
+              </a:ext>
+            </a:extLst>
+          </p:cNvPr>
+          <p:cNvSpPr>
+            <a:spLocks noGrp="1"/>
+          </p:cNvSpPr>
+          <p:nvPr>
+            <p:ph type="title"/>
+          </p:nvPr>
+        </p:nvSpPr>
+        <p:spPr/>
+        <p:txBody>
+          <a:bodyPr/>
+          <a:lstStyle/>
+          <a:p>
+            <a:r>
+              <a:rPr lang="en-US" dirty="0"/>
+              <a:t>Particle Filter</a:t>
+            </a:r>
+          </a:p>
+        </p:txBody>
+      </p:sp>
+    </p:spTree>
+    <p:extLst>
+      <p:ext uri="{BB962C8B-B14F-4D97-AF65-F5344CB8AC3E}">
+        <p14:creationId xmlns:p14="http://schemas.microsoft.com/office/powerpoint/2010/main" val="616361245"/>
+      </p:ext>
+    </p:extLst>
+  </p:cSld>
+  <p:clrMapOvr>
+    <a:masterClrMapping/>
+  </p:clrMapOvr>
+</p:sld>
+</file>
+
+<file path=ppt/slides/slide17.xml><?xml version="1.0" encoding="utf-8"?>
+<p:sld xmlns:a="http://schemas.openxmlformats.org/drawingml/2006/main" xmlns:r="http://schemas.openxmlformats.org/officeDocument/2006/relationships" xmlns:p="http://schemas.openxmlformats.org/presentationml/2006/main">
+  <p:cSld>
+    <p:spTree>
+      <p:nvGrpSpPr>
+        <p:cNvPr id="1" name=""/>
+        <p:cNvGrpSpPr/>
+        <p:nvPr/>
+      </p:nvGrpSpPr>
+      <p:grpSpPr>
+        <a:xfrm>
+          <a:off x="0" y="0"/>
+          <a:ext cx="0" cy="0"/>
+          <a:chOff x="0" y="0"/>
+          <a:chExt cx="0" cy="0"/>
+        </a:xfrm>
+      </p:grpSpPr>
+      <p:sp>
+        <p:nvSpPr>
+          <p:cNvPr id="2" name="Date Placeholder 1">
+            <a:extLst>
+              <a:ext uri="{FF2B5EF4-FFF2-40B4-BE49-F238E27FC236}">
+                <a16:creationId xmlns:a16="http://schemas.microsoft.com/office/drawing/2014/main" id="{17F4FCC4-4604-40D1-9F16-F88324ED8F57}"/>
+              </a:ext>
+            </a:extLst>
+          </p:cNvPr>
+          <p:cNvSpPr>
+            <a:spLocks noGrp="1"/>
+          </p:cNvSpPr>
+          <p:nvPr>
+            <p:ph type="dt" sz="half" idx="10"/>
+          </p:nvPr>
+        </p:nvSpPr>
+        <p:spPr/>
+        <p:txBody>
+          <a:bodyPr/>
+          <a:lstStyle/>
+          <a:p>
+            <a:fld id="{F736EC4A-E5B7-42C2-9943-4D2477F0E2BA}" type="datetime1">
+              <a:rPr lang="en-US" smtClean="0"/>
+              <a:t>2/16/2022</a:t>
+            </a:fld>
+            <a:endParaRPr lang="en-US" dirty="0"/>
+          </a:p>
+        </p:txBody>
+      </p:sp>
+      <p:sp>
+        <p:nvSpPr>
+          <p:cNvPr id="3" name="Footer Placeholder 2">
+            <a:extLst>
+              <a:ext uri="{FF2B5EF4-FFF2-40B4-BE49-F238E27FC236}">
+                <a16:creationId xmlns:a16="http://schemas.microsoft.com/office/drawing/2014/main" id="{390ECFB5-D86A-493C-BE04-56C46A03F928}"/>
+              </a:ext>
+            </a:extLst>
+          </p:cNvPr>
+          <p:cNvSpPr>
+            <a:spLocks noGrp="1"/>
+          </p:cNvSpPr>
+          <p:nvPr>
+            <p:ph type="ftr" sz="quarter" idx="11"/>
+          </p:nvPr>
+        </p:nvSpPr>
+        <p:spPr/>
+        <p:txBody>
+          <a:bodyPr/>
+          <a:lstStyle/>
+          <a:p>
+            <a:r>
+              <a:rPr lang="en-US"/>
+              <a:t>Or Sagiv &amp; Etai Sella</a:t>
+            </a:r>
+            <a:endParaRPr lang="en-US" dirty="0"/>
+          </a:p>
+        </p:txBody>
+      </p:sp>
+      <p:sp>
+        <p:nvSpPr>
+          <p:cNvPr id="4" name="Slide Number Placeholder 3">
+            <a:extLst>
+              <a:ext uri="{FF2B5EF4-FFF2-40B4-BE49-F238E27FC236}">
+                <a16:creationId xmlns:a16="http://schemas.microsoft.com/office/drawing/2014/main" id="{34B1658B-2A38-4339-AD04-15960337C0A3}"/>
+              </a:ext>
+            </a:extLst>
+          </p:cNvPr>
+          <p:cNvSpPr>
+            <a:spLocks noGrp="1"/>
+          </p:cNvSpPr>
+          <p:nvPr>
+            <p:ph type="sldNum" sz="quarter" idx="12"/>
+          </p:nvPr>
+        </p:nvSpPr>
+        <p:spPr/>
+        <p:txBody>
+          <a:bodyPr/>
+          <a:lstStyle/>
+          <a:p>
+            <a:fld id="{C629165E-D59B-453D-B763-34340D7036F6}" type="slidenum">
+              <a:rPr lang="en-US" smtClean="0"/>
+              <a:t>17</a:t>
+            </a:fld>
+            <a:endParaRPr lang="en-US" dirty="0"/>
+          </a:p>
+        </p:txBody>
+      </p:sp>
+      <mc:AlternateContent xmlns:mc="http://schemas.openxmlformats.org/markup-compatibility/2006">
+        <mc:Choice xmlns:a14="http://schemas.microsoft.com/office/drawing/2010/main" Requires="a14">
+          <p:sp>
+            <p:nvSpPr>
+              <p:cNvPr id="5" name="Content Placeholder 4">
+                <a:extLst>
+                  <a:ext uri="{FF2B5EF4-FFF2-40B4-BE49-F238E27FC236}">
+                    <a16:creationId xmlns:a16="http://schemas.microsoft.com/office/drawing/2014/main" id="{D692A99E-EB4E-41A4-A607-9B3A99A7979C}"/>
+                  </a:ext>
+                </a:extLst>
+              </p:cNvPr>
+              <p:cNvSpPr>
+                <a:spLocks noGrp="1"/>
+              </p:cNvSpPr>
+              <p:nvPr>
+                <p:ph idx="1"/>
+              </p:nvPr>
+            </p:nvSpPr>
+            <p:spPr/>
+            <p:txBody>
+              <a:bodyPr/>
+              <a:lstStyle/>
+              <a:p>
+                <a:r>
+                  <a:rPr lang="en-US" dirty="0"/>
+                  <a:t>Assume the target moves according to a motion model, for instance: </a:t>
+                </a:r>
+                <a14:m>
+                  <m:oMath xmlns:m="http://schemas.openxmlformats.org/officeDocument/2006/math">
+                    <m:r>
+                      <a:rPr lang="en-US" b="0" i="1" smtClean="0">
+                        <a:latin typeface="Cambria Math" panose="02040503050406030204" pitchFamily="18" charset="0"/>
+                      </a:rPr>
+                      <m:t>𝑥</m:t>
+                    </m:r>
+                    <m:d>
+                      <m:dPr>
+                        <m:begChr m:val="["/>
+                        <m:endChr m:val="]"/>
+                        <m:ctrlPr>
+                          <a:rPr lang="en-US" b="0" i="1" smtClean="0">
+                            <a:latin typeface="Cambria Math" panose="02040503050406030204" pitchFamily="18" charset="0"/>
+                          </a:rPr>
+                        </m:ctrlPr>
+                      </m:dPr>
+                      <m:e>
+                        <m:r>
+                          <a:rPr lang="en-US" b="0" i="1" smtClean="0">
+                            <a:latin typeface="Cambria Math" panose="02040503050406030204" pitchFamily="18" charset="0"/>
+                          </a:rPr>
+                          <m:t>𝑡</m:t>
+                        </m:r>
+                      </m:e>
+                    </m:d>
+                    <m:r>
+                      <a:rPr lang="en-US" b="0" i="1" smtClean="0">
+                        <a:latin typeface="Cambria Math" panose="02040503050406030204" pitchFamily="18" charset="0"/>
+                      </a:rPr>
+                      <m:t>=</m:t>
+                    </m:r>
+                    <m:r>
+                      <a:rPr lang="en-US" b="0" i="1" smtClean="0">
+                        <a:latin typeface="Cambria Math" panose="02040503050406030204" pitchFamily="18" charset="0"/>
+                      </a:rPr>
+                      <m:t>𝑥</m:t>
+                    </m:r>
+                    <m:d>
+                      <m:dPr>
+                        <m:begChr m:val="["/>
+                        <m:endChr m:val="]"/>
+                        <m:ctrlPr>
+                          <a:rPr lang="en-US" b="0" i="1" smtClean="0">
+                            <a:latin typeface="Cambria Math" panose="02040503050406030204" pitchFamily="18" charset="0"/>
+                          </a:rPr>
+                        </m:ctrlPr>
+                      </m:dPr>
+                      <m:e>
+                        <m:r>
+                          <a:rPr lang="en-US" b="0" i="1" smtClean="0">
+                            <a:latin typeface="Cambria Math" panose="02040503050406030204" pitchFamily="18" charset="0"/>
+                          </a:rPr>
+                          <m:t>𝑡</m:t>
+                        </m:r>
+                        <m:r>
+                          <a:rPr lang="en-US" b="0" i="1" smtClean="0">
+                            <a:latin typeface="Cambria Math" panose="02040503050406030204" pitchFamily="18" charset="0"/>
+                          </a:rPr>
+                          <m:t>−</m:t>
+                        </m:r>
+                        <m:r>
+                          <a:rPr lang="en-US" b="0" i="1" smtClean="0">
+                            <a:latin typeface="Cambria Math" panose="02040503050406030204" pitchFamily="18" charset="0"/>
+                          </a:rPr>
+                          <m:t>1</m:t>
+                        </m:r>
+                      </m:e>
+                    </m:d>
+                    <m:r>
+                      <a:rPr lang="en-US" b="0" i="1" smtClean="0">
+                        <a:latin typeface="Cambria Math" panose="02040503050406030204" pitchFamily="18" charset="0"/>
+                      </a:rPr>
+                      <m:t>+</m:t>
+                    </m:r>
+                    <m:r>
+                      <a:rPr lang="en-US" b="0" i="1" smtClean="0">
+                        <a:latin typeface="Cambria Math" panose="02040503050406030204" pitchFamily="18" charset="0"/>
+                      </a:rPr>
+                      <m:t>𝑣</m:t>
+                    </m:r>
+                    <m:r>
+                      <a:rPr lang="en-US" b="0" i="1" smtClean="0">
+                        <a:latin typeface="Cambria Math" panose="02040503050406030204" pitchFamily="18" charset="0"/>
+                      </a:rPr>
+                      <m:t>[</m:t>
+                    </m:r>
+                    <m:r>
+                      <a:rPr lang="en-US" b="0" i="1" smtClean="0">
+                        <a:latin typeface="Cambria Math" panose="02040503050406030204" pitchFamily="18" charset="0"/>
+                      </a:rPr>
+                      <m:t>𝑡</m:t>
+                    </m:r>
+                    <m:r>
+                      <a:rPr lang="en-US" b="0" i="1" smtClean="0">
+                        <a:latin typeface="Cambria Math" panose="02040503050406030204" pitchFamily="18" charset="0"/>
+                      </a:rPr>
+                      <m:t>−</m:t>
+                    </m:r>
+                    <m:r>
+                      <a:rPr lang="en-US" b="0" i="1" smtClean="0">
+                        <a:latin typeface="Cambria Math" panose="02040503050406030204" pitchFamily="18" charset="0"/>
+                      </a:rPr>
+                      <m:t>1</m:t>
+                    </m:r>
+                    <m:r>
+                      <a:rPr lang="en-US" b="0" i="1" smtClean="0">
+                        <a:latin typeface="Cambria Math" panose="02040503050406030204" pitchFamily="18" charset="0"/>
+                      </a:rPr>
+                      <m:t>]</m:t>
+                    </m:r>
+                  </m:oMath>
+                </a14:m>
+                <a:r>
+                  <a:rPr lang="en-US" dirty="0"/>
+                  <a:t> </a:t>
+                </a:r>
+              </a:p>
+              <a:p>
+                <a:r>
+                  <a:rPr lang="en-US" dirty="0"/>
+                  <a:t>Define a “state” for the object, for instance </a:t>
+                </a:r>
+                <a14:m>
+                  <m:oMath xmlns:m="http://schemas.openxmlformats.org/officeDocument/2006/math">
+                    <m:r>
+                      <a:rPr lang="en-US" b="0" i="1" smtClean="0">
+                        <a:latin typeface="Cambria Math" panose="02040503050406030204" pitchFamily="18" charset="0"/>
+                      </a:rPr>
+                      <m:t>[</m:t>
+                    </m:r>
+                    <m:r>
+                      <a:rPr lang="en-US" b="0" i="1" smtClean="0">
+                        <a:latin typeface="Cambria Math" panose="02040503050406030204" pitchFamily="18" charset="0"/>
+                      </a:rPr>
+                      <m:t>𝑥</m:t>
+                    </m:r>
+                    <m:r>
+                      <a:rPr lang="en-US" b="0" i="1" smtClean="0">
+                        <a:latin typeface="Cambria Math" panose="02040503050406030204" pitchFamily="18" charset="0"/>
+                      </a:rPr>
+                      <m:t>, </m:t>
+                    </m:r>
+                    <m:r>
+                      <a:rPr lang="en-US" b="0" i="1" smtClean="0">
+                        <a:latin typeface="Cambria Math" panose="02040503050406030204" pitchFamily="18" charset="0"/>
+                      </a:rPr>
+                      <m:t>𝑦</m:t>
+                    </m:r>
+                    <m:r>
+                      <a:rPr lang="en-US" b="0" i="1" smtClean="0">
+                        <a:latin typeface="Cambria Math" panose="02040503050406030204" pitchFamily="18" charset="0"/>
+                      </a:rPr>
+                      <m:t>, </m:t>
+                    </m:r>
+                    <m:sSub>
+                      <m:sSubPr>
+                        <m:ctrlPr>
+                          <a:rPr lang="en-US" b="0" i="1" smtClean="0">
+                            <a:latin typeface="Cambria Math" panose="02040503050406030204" pitchFamily="18" charset="0"/>
+                          </a:rPr>
+                        </m:ctrlPr>
+                      </m:sSubPr>
+                      <m:e>
+                        <m:r>
+                          <a:rPr lang="en-US" b="0" i="1" smtClean="0">
+                            <a:latin typeface="Cambria Math" panose="02040503050406030204" pitchFamily="18" charset="0"/>
+                          </a:rPr>
+                          <m:t>𝑣</m:t>
+                        </m:r>
+                      </m:e>
+                      <m:sub>
+                        <m:r>
+                          <a:rPr lang="en-US" b="0" i="1" smtClean="0">
+                            <a:latin typeface="Cambria Math" panose="02040503050406030204" pitchFamily="18" charset="0"/>
+                          </a:rPr>
+                          <m:t>𝑥</m:t>
+                        </m:r>
+                      </m:sub>
+                    </m:sSub>
+                    <m:r>
+                      <a:rPr lang="en-US" b="0" i="1" smtClean="0">
+                        <a:latin typeface="Cambria Math" panose="02040503050406030204" pitchFamily="18" charset="0"/>
+                      </a:rPr>
+                      <m:t>, </m:t>
+                    </m:r>
+                    <m:sSub>
+                      <m:sSubPr>
+                        <m:ctrlPr>
+                          <a:rPr lang="en-US" b="0" i="1" smtClean="0">
+                            <a:latin typeface="Cambria Math" panose="02040503050406030204" pitchFamily="18" charset="0"/>
+                          </a:rPr>
+                        </m:ctrlPr>
+                      </m:sSubPr>
+                      <m:e>
+                        <m:r>
+                          <a:rPr lang="en-US" b="0" i="1" smtClean="0">
+                            <a:latin typeface="Cambria Math" panose="02040503050406030204" pitchFamily="18" charset="0"/>
+                          </a:rPr>
+                          <m:t>𝑣</m:t>
+                        </m:r>
+                      </m:e>
+                      <m:sub>
+                        <m:r>
+                          <a:rPr lang="en-US" b="0" i="1" smtClean="0">
+                            <a:latin typeface="Cambria Math" panose="02040503050406030204" pitchFamily="18" charset="0"/>
+                          </a:rPr>
+                          <m:t>𝑦</m:t>
+                        </m:r>
+                      </m:sub>
+                    </m:sSub>
+                    <m:r>
+                      <a:rPr lang="en-US" b="0" i="1" smtClean="0">
+                        <a:latin typeface="Cambria Math" panose="02040503050406030204" pitchFamily="18" charset="0"/>
+                      </a:rPr>
+                      <m:t>, </m:t>
+                    </m:r>
+                    <m:sSub>
+                      <m:sSubPr>
+                        <m:ctrlPr>
+                          <a:rPr lang="en-US" b="0" i="1" smtClean="0">
+                            <a:latin typeface="Cambria Math" panose="02040503050406030204" pitchFamily="18" charset="0"/>
+                          </a:rPr>
+                        </m:ctrlPr>
+                      </m:sSubPr>
+                      <m:e>
+                        <m:r>
+                          <a:rPr lang="en-US" b="0" i="1" smtClean="0">
+                            <a:latin typeface="Cambria Math" panose="02040503050406030204" pitchFamily="18" charset="0"/>
+                          </a:rPr>
+                          <m:t>𝑤</m:t>
+                        </m:r>
+                      </m:e>
+                      <m:sub>
+                        <m:r>
+                          <a:rPr lang="en-US" b="0" i="1" smtClean="0">
+                            <a:latin typeface="Cambria Math" panose="02040503050406030204" pitchFamily="18" charset="0"/>
+                          </a:rPr>
+                          <m:t>𝑏𝑜𝑥</m:t>
+                        </m:r>
+                      </m:sub>
+                    </m:sSub>
+                    <m:r>
+                      <a:rPr lang="en-US" b="0" i="1" smtClean="0">
+                        <a:latin typeface="Cambria Math" panose="02040503050406030204" pitchFamily="18" charset="0"/>
+                      </a:rPr>
+                      <m:t>, </m:t>
+                    </m:r>
+                    <m:sSub>
+                      <m:sSubPr>
+                        <m:ctrlPr>
+                          <a:rPr lang="en-US" b="0" i="1" smtClean="0">
+                            <a:latin typeface="Cambria Math" panose="02040503050406030204" pitchFamily="18" charset="0"/>
+                          </a:rPr>
+                        </m:ctrlPr>
+                      </m:sSubPr>
+                      <m:e>
+                        <m:r>
+                          <a:rPr lang="en-US" b="0" i="1" smtClean="0">
+                            <a:latin typeface="Cambria Math" panose="02040503050406030204" pitchFamily="18" charset="0"/>
+                          </a:rPr>
+                          <m:t>h</m:t>
+                        </m:r>
+                      </m:e>
+                      <m:sub>
+                        <m:r>
+                          <a:rPr lang="en-US" b="0" i="1" smtClean="0">
+                            <a:latin typeface="Cambria Math" panose="02040503050406030204" pitchFamily="18" charset="0"/>
+                          </a:rPr>
+                          <m:t>𝑏𝑜𝑥</m:t>
+                        </m:r>
+                      </m:sub>
+                    </m:sSub>
+                    <m:r>
+                      <a:rPr lang="en-US" b="0" i="1" smtClean="0">
+                        <a:latin typeface="Cambria Math" panose="02040503050406030204" pitchFamily="18" charset="0"/>
+                      </a:rPr>
+                      <m:t>]</m:t>
+                    </m:r>
+                  </m:oMath>
+                </a14:m>
+                <a:endParaRPr lang="en-US" dirty="0"/>
+              </a:p>
+              <a:p>
+                <a:r>
+                  <a:rPr lang="en-US" dirty="0"/>
+                  <a:t>At each frame:</a:t>
+                </a:r>
+              </a:p>
+              <a:p>
+                <a:pPr marL="914400" lvl="1" indent="-457200">
+                  <a:buAutoNum type="arabicParenR"/>
+                </a:pPr>
+                <a:r>
+                  <a:rPr lang="en-US" dirty="0"/>
+                  <a:t>Predict object states (particles) according to motion model + noise and the former particles.</a:t>
+                </a:r>
+              </a:p>
+              <a:p>
+                <a:pPr marL="914400" lvl="1" indent="-457200">
+                  <a:buAutoNum type="arabicParenR"/>
+                </a:pPr>
+                <a:r>
+                  <a:rPr lang="en-US" dirty="0"/>
+                  <a:t>Give particles that fit the GT well a large weight</a:t>
+                </a:r>
+              </a:p>
+              <a:p>
+                <a:pPr marL="914400" lvl="1" indent="-457200">
+                  <a:buAutoNum type="arabicParenR"/>
+                </a:pPr>
+                <a:r>
+                  <a:rPr lang="en-US" dirty="0"/>
+                  <a:t>Sample the particles according to their weight to calculate new state.</a:t>
+                </a:r>
+              </a:p>
+            </p:txBody>
+          </p:sp>
+        </mc:Choice>
+        <mc:Fallback>
+          <p:sp>
+            <p:nvSpPr>
+              <p:cNvPr id="5" name="Content Placeholder 4">
+                <a:extLst>
+                  <a:ext uri="{FF2B5EF4-FFF2-40B4-BE49-F238E27FC236}">
+                    <a16:creationId xmlns:a16="http://schemas.microsoft.com/office/drawing/2014/main" id="{D692A99E-EB4E-41A4-A607-9B3A99A7979C}"/>
+                  </a:ext>
+                </a:extLst>
+              </p:cNvPr>
+              <p:cNvSpPr>
+                <a:spLocks noGrp="1" noRot="1" noChangeAspect="1" noMove="1" noResize="1" noEditPoints="1" noAdjustHandles="1" noChangeArrowheads="1" noChangeShapeType="1" noTextEdit="1"/>
+              </p:cNvSpPr>
+              <p:nvPr>
+                <p:ph idx="1"/>
+              </p:nvPr>
+            </p:nvSpPr>
+            <p:spPr>
+              <a:blipFill>
+                <a:blip r:embed="rId2"/>
+                <a:stretch>
+                  <a:fillRect l="-1017" t="-2464"/>
+                </a:stretch>
+              </a:blipFill>
+            </p:spPr>
+            <p:txBody>
+              <a:bodyPr/>
+              <a:lstStyle/>
+              <a:p>
+                <a:r>
+                  <a:rPr lang="en-US">
+                    <a:noFill/>
+                  </a:rPr>
+                  <a:t> </a:t>
+                </a:r>
+              </a:p>
+            </p:txBody>
+          </p:sp>
+        </mc:Fallback>
+      </mc:AlternateContent>
+      <p:sp>
+        <p:nvSpPr>
+          <p:cNvPr id="6" name="Title 5">
+            <a:extLst>
+              <a:ext uri="{FF2B5EF4-FFF2-40B4-BE49-F238E27FC236}">
+                <a16:creationId xmlns:a16="http://schemas.microsoft.com/office/drawing/2014/main" id="{E9E4C79A-08FA-4D88-949A-AE7B6340D376}"/>
+              </a:ext>
+            </a:extLst>
+          </p:cNvPr>
+          <p:cNvSpPr>
+            <a:spLocks noGrp="1"/>
+          </p:cNvSpPr>
+          <p:nvPr>
+            <p:ph type="title"/>
+          </p:nvPr>
+        </p:nvSpPr>
+        <p:spPr/>
+        <p:txBody>
+          <a:bodyPr/>
+          <a:lstStyle/>
+          <a:p>
+            <a:r>
+              <a:rPr lang="en-US" dirty="0"/>
+              <a:t>Particle Filter</a:t>
+            </a:r>
+          </a:p>
+        </p:txBody>
+      </p:sp>
+    </p:spTree>
+    <p:extLst>
+      <p:ext uri="{BB962C8B-B14F-4D97-AF65-F5344CB8AC3E}">
+        <p14:creationId xmlns:p14="http://schemas.microsoft.com/office/powerpoint/2010/main" val="273299825"/>
+      </p:ext>
+    </p:extLst>
+  </p:cSld>
+  <p:clrMapOvr>
+    <a:masterClrMapping/>
+  </p:clrMapOvr>
+</p:sld>
+</file>
+
+<file path=ppt/slides/slide18.xml><?xml version="1.0" encoding="utf-8"?>
+<p:sld xmlns:a="http://schemas.openxmlformats.org/drawingml/2006/main" xmlns:r="http://schemas.openxmlformats.org/officeDocument/2006/relationships" xmlns:p="http://schemas.openxmlformats.org/presentationml/2006/main">
+  <p:cSld>
+    <p:spTree>
+      <p:nvGrpSpPr>
+        <p:cNvPr id="1" name=""/>
+        <p:cNvGrpSpPr/>
+        <p:nvPr/>
+      </p:nvGrpSpPr>
+      <p:grpSpPr>
+        <a:xfrm>
+          <a:off x="0" y="0"/>
+          <a:ext cx="0" cy="0"/>
+          <a:chOff x="0" y="0"/>
+          <a:chExt cx="0" cy="0"/>
+        </a:xfrm>
+      </p:grpSpPr>
+      <p:pic>
+        <p:nvPicPr>
+          <p:cNvPr id="49" name="Content Placeholder 7" descr="A picture containing building, outdoor, outdoor object&#10;&#10;Description automatically generated">
+            <a:extLst>
+              <a:ext uri="{FF2B5EF4-FFF2-40B4-BE49-F238E27FC236}">
+                <a16:creationId xmlns:a16="http://schemas.microsoft.com/office/drawing/2014/main" id="{1B8866DF-FACF-4E14-8680-BA2E9DCD645E}"/>
+              </a:ext>
+            </a:extLst>
+          </p:cNvPr>
+          <p:cNvPicPr>
+            <a:picLocks noChangeAspect="1"/>
+          </p:cNvPicPr>
+          <p:nvPr/>
+        </p:nvPicPr>
+        <p:blipFill>
+          <a:blip r:embed="rId3">
+            <a:extLst>
+              <a:ext uri="{28A0092B-C50C-407E-A947-70E740481C1C}">
+                <a14:useLocalDpi xmlns:a14="http://schemas.microsoft.com/office/drawing/2010/main" val="0"/>
+              </a:ext>
+            </a:extLst>
+          </a:blip>
+          <a:stretch>
+            <a:fillRect/>
+          </a:stretch>
+        </p:blipFill>
+        <p:spPr>
+          <a:xfrm>
+            <a:off x="1351766" y="2548788"/>
+            <a:ext cx="3876676" cy="3171826"/>
+          </a:xfrm>
+          <a:prstGeom prst="rect">
+            <a:avLst/>
+          </a:prstGeom>
+          <a:ln>
+            <a:noFill/>
+          </a:ln>
+        </p:spPr>
+      </p:pic>
+      <p:sp>
+        <p:nvSpPr>
+          <p:cNvPr id="2" name="Date Placeholder 1">
+            <a:extLst>
+              <a:ext uri="{FF2B5EF4-FFF2-40B4-BE49-F238E27FC236}">
+                <a16:creationId xmlns:a16="http://schemas.microsoft.com/office/drawing/2014/main" id="{8AABA0BB-0402-4373-859D-6F13BC460170}"/>
+              </a:ext>
+            </a:extLst>
+          </p:cNvPr>
+          <p:cNvSpPr>
+            <a:spLocks noGrp="1"/>
+          </p:cNvSpPr>
+          <p:nvPr>
+            <p:ph type="dt" sz="half" idx="10"/>
+          </p:nvPr>
+        </p:nvSpPr>
+        <p:spPr/>
+        <p:txBody>
+          <a:bodyPr/>
+          <a:lstStyle/>
+          <a:p>
+            <a:fld id="{F736EC4A-E5B7-42C2-9943-4D2477F0E2BA}" type="datetime1">
+              <a:rPr lang="en-US" smtClean="0"/>
+              <a:t>2/16/2022</a:t>
+            </a:fld>
+            <a:endParaRPr lang="en-US" dirty="0"/>
+          </a:p>
+        </p:txBody>
+      </p:sp>
+      <p:sp>
+        <p:nvSpPr>
+          <p:cNvPr id="3" name="Footer Placeholder 2">
+            <a:extLst>
+              <a:ext uri="{FF2B5EF4-FFF2-40B4-BE49-F238E27FC236}">
+                <a16:creationId xmlns:a16="http://schemas.microsoft.com/office/drawing/2014/main" id="{4CA38CF6-425B-4615-A765-9C6F53492D09}"/>
+              </a:ext>
+            </a:extLst>
+          </p:cNvPr>
+          <p:cNvSpPr>
+            <a:spLocks noGrp="1"/>
+          </p:cNvSpPr>
+          <p:nvPr>
+            <p:ph type="ftr" sz="quarter" idx="11"/>
+          </p:nvPr>
+        </p:nvSpPr>
+        <p:spPr/>
+        <p:txBody>
+          <a:bodyPr/>
+          <a:lstStyle/>
+          <a:p>
+            <a:r>
+              <a:rPr lang="en-US"/>
+              <a:t>Or Sagiv &amp; Etai Sella</a:t>
+            </a:r>
+            <a:endParaRPr lang="en-US" dirty="0"/>
+          </a:p>
+        </p:txBody>
+      </p:sp>
+      <p:sp>
+        <p:nvSpPr>
+          <p:cNvPr id="4" name="Slide Number Placeholder 3">
+            <a:extLst>
+              <a:ext uri="{FF2B5EF4-FFF2-40B4-BE49-F238E27FC236}">
+                <a16:creationId xmlns:a16="http://schemas.microsoft.com/office/drawing/2014/main" id="{6C620BA3-F0DC-4BB6-9276-6EBFBDB62FBC}"/>
+              </a:ext>
+            </a:extLst>
+          </p:cNvPr>
+          <p:cNvSpPr>
+            <a:spLocks noGrp="1"/>
+          </p:cNvSpPr>
+          <p:nvPr>
+            <p:ph type="sldNum" sz="quarter" idx="12"/>
+          </p:nvPr>
+        </p:nvSpPr>
+        <p:spPr/>
+        <p:txBody>
+          <a:bodyPr/>
+          <a:lstStyle/>
+          <a:p>
+            <a:fld id="{C629165E-D59B-453D-B763-34340D7036F6}" type="slidenum">
+              <a:rPr lang="en-US" smtClean="0"/>
+              <a:t>18</a:t>
+            </a:fld>
+            <a:endParaRPr lang="en-US" dirty="0"/>
+          </a:p>
+        </p:txBody>
+      </p:sp>
+      <p:pic>
+        <p:nvPicPr>
+          <p:cNvPr id="8" name="Content Placeholder 7" descr="A picture containing building, outdoor, outdoor object&#10;&#10;Description automatically generated">
+            <a:extLst>
+              <a:ext uri="{FF2B5EF4-FFF2-40B4-BE49-F238E27FC236}">
+                <a16:creationId xmlns:a16="http://schemas.microsoft.com/office/drawing/2014/main" id="{E2F3B7F5-A39D-4645-8306-3F42525DCFD4}"/>
+              </a:ext>
+            </a:extLst>
+          </p:cNvPr>
+          <p:cNvPicPr>
+            <a:picLocks noGrp="1" noChangeAspect="1"/>
+          </p:cNvPicPr>
+          <p:nvPr>
+            <p:ph idx="1"/>
+          </p:nvPr>
+        </p:nvPicPr>
+        <p:blipFill>
+          <a:blip r:embed="rId3">
+            <a:extLst>
+              <a:ext uri="{28A0092B-C50C-407E-A947-70E740481C1C}">
+                <a14:useLocalDpi xmlns:a14="http://schemas.microsoft.com/office/drawing/2010/main" val="0"/>
+              </a:ext>
+            </a:extLst>
+          </a:blip>
+          <a:stretch>
+            <a:fillRect/>
+          </a:stretch>
+        </p:blipFill>
+        <p:spPr>
+          <a:xfrm>
+            <a:off x="6923303" y="2548788"/>
+            <a:ext cx="3876676" cy="3171826"/>
+          </a:xfrm>
+        </p:spPr>
+      </p:pic>
+      <p:sp>
+        <p:nvSpPr>
+          <p:cNvPr id="6" name="Title 5">
+            <a:extLst>
+              <a:ext uri="{FF2B5EF4-FFF2-40B4-BE49-F238E27FC236}">
+                <a16:creationId xmlns:a16="http://schemas.microsoft.com/office/drawing/2014/main" id="{5F36854F-5562-4B15-A113-787D0B27EA0F}"/>
+              </a:ext>
+            </a:extLst>
+          </p:cNvPr>
+          <p:cNvSpPr>
+            <a:spLocks noGrp="1"/>
+          </p:cNvSpPr>
+          <p:nvPr>
+            <p:ph type="title"/>
+          </p:nvPr>
+        </p:nvSpPr>
+        <p:spPr/>
+        <p:txBody>
+          <a:bodyPr/>
+          <a:lstStyle/>
+          <a:p>
+            <a:r>
+              <a:rPr lang="en-US" dirty="0"/>
+              <a:t>Particle Filter</a:t>
+            </a:r>
+          </a:p>
+        </p:txBody>
+      </p:sp>
+      <p:sp>
+        <p:nvSpPr>
+          <p:cNvPr id="27" name="TextBox 26">
+            <a:extLst>
+              <a:ext uri="{FF2B5EF4-FFF2-40B4-BE49-F238E27FC236}">
+                <a16:creationId xmlns:a16="http://schemas.microsoft.com/office/drawing/2014/main" id="{BE37F754-9BF4-4086-911B-E78008C2E5AF}"/>
+              </a:ext>
+            </a:extLst>
+          </p:cNvPr>
+          <p:cNvSpPr txBox="1"/>
+          <p:nvPr/>
+        </p:nvSpPr>
+        <p:spPr>
+          <a:xfrm>
+            <a:off x="7585879" y="1847072"/>
+            <a:ext cx="2618394" cy="523220"/>
+          </a:xfrm>
+          <a:prstGeom prst="rect">
+            <a:avLst/>
+          </a:prstGeom>
+          <a:noFill/>
+        </p:spPr>
+        <p:txBody>
+          <a:bodyPr wrap="square" rtlCol="0">
+            <a:spAutoFit/>
+          </a:bodyPr>
+          <a:lstStyle/>
+          <a:p>
+            <a:r>
+              <a:rPr lang="en-US" sz="2800" dirty="0"/>
+              <a:t>Former Particles</a:t>
+            </a:r>
+          </a:p>
+        </p:txBody>
+      </p:sp>
+      <p:sp>
+        <p:nvSpPr>
+          <p:cNvPr id="29" name="Rectangle 28">
+            <a:extLst>
+              <a:ext uri="{FF2B5EF4-FFF2-40B4-BE49-F238E27FC236}">
+                <a16:creationId xmlns:a16="http://schemas.microsoft.com/office/drawing/2014/main" id="{22E32ACF-FC2E-4B73-ACAB-DE76C45B1E31}"/>
+              </a:ext>
+            </a:extLst>
+          </p:cNvPr>
+          <p:cNvSpPr/>
+          <p:nvPr/>
+        </p:nvSpPr>
+        <p:spPr>
+          <a:xfrm>
+            <a:off x="9275975" y="3429000"/>
+            <a:ext cx="507868" cy="775355"/>
+          </a:xfrm>
+          <a:prstGeom prst="rect">
+            <a:avLst/>
+          </a:prstGeom>
+          <a:noFill/>
+          <a:ln w="57150">
+            <a:solidFill>
+              <a:srgbClr val="FFFF00"/>
+            </a:solidFill>
+          </a:ln>
+        </p:spPr>
+        <p:style>
+          <a:lnRef idx="2">
+            <a:schemeClr val="accent1">
+              <a:shade val="50000"/>
+            </a:schemeClr>
+          </a:lnRef>
+          <a:fillRef idx="1">
+            <a:schemeClr val="accent1"/>
+          </a:fillRef>
+          <a:effectRef idx="0">
+            <a:schemeClr val="accent1"/>
+          </a:effectRef>
+          <a:fontRef idx="minor">
+            <a:schemeClr val="lt1"/>
+          </a:fontRef>
+        </p:style>
+        <p:txBody>
+          <a:bodyPr rtlCol="0" anchor="ctr"/>
+          <a:lstStyle/>
+          <a:p>
+            <a:pPr algn="ctr"/>
+            <a:endParaRPr lang="en-US"/>
+          </a:p>
+        </p:txBody>
+      </p:sp>
+      <p:sp>
+        <p:nvSpPr>
+          <p:cNvPr id="30" name="Rectangle 29">
+            <a:extLst>
+              <a:ext uri="{FF2B5EF4-FFF2-40B4-BE49-F238E27FC236}">
+                <a16:creationId xmlns:a16="http://schemas.microsoft.com/office/drawing/2014/main" id="{FD097935-34E7-4684-86C0-033E374FA371}"/>
+              </a:ext>
+            </a:extLst>
+          </p:cNvPr>
+          <p:cNvSpPr/>
+          <p:nvPr/>
+        </p:nvSpPr>
+        <p:spPr>
+          <a:xfrm>
+            <a:off x="9558191" y="3742441"/>
+            <a:ext cx="507868" cy="1096259"/>
+          </a:xfrm>
+          <a:prstGeom prst="rect">
+            <a:avLst/>
+          </a:prstGeom>
+          <a:noFill/>
+          <a:ln w="57150"/>
+        </p:spPr>
+        <p:style>
+          <a:lnRef idx="2">
+            <a:schemeClr val="accent1">
+              <a:shade val="50000"/>
+            </a:schemeClr>
+          </a:lnRef>
+          <a:fillRef idx="1">
+            <a:schemeClr val="accent1"/>
+          </a:fillRef>
+          <a:effectRef idx="0">
+            <a:schemeClr val="accent1"/>
+          </a:effectRef>
+          <a:fontRef idx="minor">
+            <a:schemeClr val="lt1"/>
+          </a:fontRef>
+        </p:style>
+        <p:txBody>
+          <a:bodyPr rtlCol="0" anchor="ctr"/>
+          <a:lstStyle/>
+          <a:p>
+            <a:pPr algn="ctr"/>
+            <a:endParaRPr lang="en-US"/>
+          </a:p>
+        </p:txBody>
+      </p:sp>
+      <p:sp>
+        <p:nvSpPr>
+          <p:cNvPr id="31" name="Rectangle 30">
+            <a:extLst>
+              <a:ext uri="{FF2B5EF4-FFF2-40B4-BE49-F238E27FC236}">
+                <a16:creationId xmlns:a16="http://schemas.microsoft.com/office/drawing/2014/main" id="{02729020-8644-4AB6-B4DF-3E356A46EAC2}"/>
+              </a:ext>
+            </a:extLst>
+          </p:cNvPr>
+          <p:cNvSpPr/>
+          <p:nvPr/>
+        </p:nvSpPr>
+        <p:spPr>
+          <a:xfrm>
+            <a:off x="9313685" y="4574808"/>
+            <a:ext cx="507868" cy="647642"/>
+          </a:xfrm>
+          <a:prstGeom prst="rect">
+            <a:avLst/>
+          </a:prstGeom>
+          <a:noFill/>
+          <a:ln w="57150">
+            <a:solidFill>
+              <a:srgbClr val="FF0000"/>
+            </a:solidFill>
+          </a:ln>
+        </p:spPr>
+        <p:style>
+          <a:lnRef idx="2">
+            <a:schemeClr val="accent1">
+              <a:shade val="50000"/>
+            </a:schemeClr>
+          </a:lnRef>
+          <a:fillRef idx="1">
+            <a:schemeClr val="accent1"/>
+          </a:fillRef>
+          <a:effectRef idx="0">
+            <a:schemeClr val="accent1"/>
+          </a:effectRef>
+          <a:fontRef idx="minor">
+            <a:schemeClr val="lt1"/>
+          </a:fontRef>
+        </p:style>
+        <p:txBody>
+          <a:bodyPr rtlCol="0" anchor="ctr"/>
+          <a:lstStyle/>
+          <a:p>
+            <a:pPr algn="ctr"/>
+            <a:endParaRPr lang="en-US"/>
+          </a:p>
+        </p:txBody>
+      </p:sp>
+      <p:sp>
+        <p:nvSpPr>
+          <p:cNvPr id="32" name="Rectangle 31">
+            <a:extLst>
+              <a:ext uri="{FF2B5EF4-FFF2-40B4-BE49-F238E27FC236}">
+                <a16:creationId xmlns:a16="http://schemas.microsoft.com/office/drawing/2014/main" id="{93D13754-9665-4D4A-97CC-BE2AD9413005}"/>
+              </a:ext>
+            </a:extLst>
+          </p:cNvPr>
+          <p:cNvSpPr/>
+          <p:nvPr/>
+        </p:nvSpPr>
+        <p:spPr>
+          <a:xfrm>
+            <a:off x="8895076" y="4451023"/>
+            <a:ext cx="507868" cy="647642"/>
+          </a:xfrm>
+          <a:prstGeom prst="rect">
+            <a:avLst/>
+          </a:prstGeom>
+          <a:noFill/>
+          <a:ln w="57150">
+            <a:solidFill>
+              <a:schemeClr val="accent2">
+                <a:lumMod val="75000"/>
+              </a:schemeClr>
+            </a:solidFill>
+          </a:ln>
+        </p:spPr>
+        <p:style>
+          <a:lnRef idx="2">
+            <a:schemeClr val="accent1">
+              <a:shade val="50000"/>
+            </a:schemeClr>
+          </a:lnRef>
+          <a:fillRef idx="1">
+            <a:schemeClr val="accent1"/>
+          </a:fillRef>
+          <a:effectRef idx="0">
+            <a:schemeClr val="accent1"/>
+          </a:effectRef>
+          <a:fontRef idx="minor">
+            <a:schemeClr val="lt1"/>
+          </a:fontRef>
+        </p:style>
+        <p:txBody>
+          <a:bodyPr rtlCol="0" anchor="ctr"/>
+          <a:lstStyle/>
+          <a:p>
+            <a:pPr algn="ctr"/>
+            <a:endParaRPr lang="en-US"/>
+          </a:p>
+        </p:txBody>
+      </p:sp>
+      <p:cxnSp>
+        <p:nvCxnSpPr>
+          <p:cNvPr id="34" name="Straight Arrow Connector 33">
+            <a:extLst>
+              <a:ext uri="{FF2B5EF4-FFF2-40B4-BE49-F238E27FC236}">
+                <a16:creationId xmlns:a16="http://schemas.microsoft.com/office/drawing/2014/main" id="{A8E333AC-CD0D-459D-B8C4-BA09C91EC38A}"/>
+              </a:ext>
+            </a:extLst>
+          </p:cNvPr>
+          <p:cNvCxnSpPr/>
+          <p:nvPr/>
+        </p:nvCxnSpPr>
+        <p:spPr>
+          <a:xfrm flipH="1">
+            <a:off x="9078012" y="3742441"/>
+            <a:ext cx="414190" cy="188536"/>
+          </a:xfrm>
+          <a:prstGeom prst="straightConnector1">
+            <a:avLst/>
+          </a:prstGeom>
+          <a:ln w="28575">
+            <a:solidFill>
+              <a:srgbClr val="FFFF00"/>
+            </a:solidFill>
+            <a:tailEnd type="triangle"/>
+          </a:ln>
+        </p:spPr>
+        <p:style>
+          <a:lnRef idx="1">
+            <a:schemeClr val="accent1"/>
+          </a:lnRef>
+          <a:fillRef idx="0">
+            <a:schemeClr val="accent1"/>
+          </a:fillRef>
+          <a:effectRef idx="0">
+            <a:schemeClr val="accent1"/>
+          </a:effectRef>
+          <a:fontRef idx="minor">
+            <a:schemeClr val="tx1"/>
+          </a:fontRef>
+        </p:style>
+      </p:cxnSp>
+      <p:cxnSp>
+        <p:nvCxnSpPr>
+          <p:cNvPr id="35" name="Straight Arrow Connector 34">
+            <a:extLst>
+              <a:ext uri="{FF2B5EF4-FFF2-40B4-BE49-F238E27FC236}">
+                <a16:creationId xmlns:a16="http://schemas.microsoft.com/office/drawing/2014/main" id="{41E3C2EE-D594-4CB8-B017-D9343A2C6F3D}"/>
+              </a:ext>
+            </a:extLst>
+          </p:cNvPr>
+          <p:cNvCxnSpPr>
+            <a:cxnSpLocks/>
+          </p:cNvCxnSpPr>
+          <p:nvPr/>
+        </p:nvCxnSpPr>
+        <p:spPr>
+          <a:xfrm flipH="1">
+            <a:off x="9379674" y="4295541"/>
+            <a:ext cx="441881" cy="12901"/>
+          </a:xfrm>
+          <a:prstGeom prst="straightConnector1">
+            <a:avLst/>
+          </a:prstGeom>
+          <a:ln w="28575">
+            <a:solidFill>
+              <a:srgbClr val="0070C0"/>
+            </a:solidFill>
+            <a:tailEnd type="triangle"/>
+          </a:ln>
+        </p:spPr>
+        <p:style>
+          <a:lnRef idx="1">
+            <a:schemeClr val="accent1"/>
+          </a:lnRef>
+          <a:fillRef idx="0">
+            <a:schemeClr val="accent1"/>
+          </a:fillRef>
+          <a:effectRef idx="0">
+            <a:schemeClr val="accent1"/>
+          </a:effectRef>
+          <a:fontRef idx="minor">
+            <a:schemeClr val="tx1"/>
+          </a:fontRef>
+        </p:style>
+      </p:cxnSp>
+      <p:cxnSp>
+        <p:nvCxnSpPr>
+          <p:cNvPr id="38" name="Straight Arrow Connector 37">
+            <a:extLst>
+              <a:ext uri="{FF2B5EF4-FFF2-40B4-BE49-F238E27FC236}">
+                <a16:creationId xmlns:a16="http://schemas.microsoft.com/office/drawing/2014/main" id="{1C75A3B6-BFC2-4CD2-A4B8-40E53C0DA916}"/>
+              </a:ext>
+            </a:extLst>
+          </p:cNvPr>
+          <p:cNvCxnSpPr>
+            <a:cxnSpLocks/>
+          </p:cNvCxnSpPr>
+          <p:nvPr/>
+        </p:nvCxnSpPr>
+        <p:spPr>
+          <a:xfrm flipH="1">
+            <a:off x="9038542" y="4744432"/>
+            <a:ext cx="110468" cy="177117"/>
+          </a:xfrm>
+          <a:prstGeom prst="straightConnector1">
+            <a:avLst/>
+          </a:prstGeom>
+          <a:ln w="28575">
+            <a:solidFill>
+              <a:schemeClr val="accent2">
+                <a:lumMod val="75000"/>
+              </a:schemeClr>
+            </a:solidFill>
+            <a:tailEnd type="triangle"/>
+          </a:ln>
+        </p:spPr>
+        <p:style>
+          <a:lnRef idx="1">
+            <a:schemeClr val="accent1"/>
+          </a:lnRef>
+          <a:fillRef idx="0">
+            <a:schemeClr val="accent1"/>
+          </a:fillRef>
+          <a:effectRef idx="0">
+            <a:schemeClr val="accent1"/>
+          </a:effectRef>
+          <a:fontRef idx="minor">
+            <a:schemeClr val="tx1"/>
+          </a:fontRef>
+        </p:style>
+      </p:cxnSp>
+      <p:cxnSp>
+        <p:nvCxnSpPr>
+          <p:cNvPr id="41" name="Straight Arrow Connector 40">
+            <a:extLst>
+              <a:ext uri="{FF2B5EF4-FFF2-40B4-BE49-F238E27FC236}">
+                <a16:creationId xmlns:a16="http://schemas.microsoft.com/office/drawing/2014/main" id="{1095EC39-26BD-473D-B412-E52922899A2D}"/>
+              </a:ext>
+            </a:extLst>
+          </p:cNvPr>
+          <p:cNvCxnSpPr>
+            <a:cxnSpLocks/>
+          </p:cNvCxnSpPr>
+          <p:nvPr/>
+        </p:nvCxnSpPr>
+        <p:spPr>
+          <a:xfrm>
+            <a:off x="9595899" y="4910664"/>
+            <a:ext cx="94856" cy="158952"/>
+          </a:xfrm>
+          <a:prstGeom prst="straightConnector1">
+            <a:avLst/>
+          </a:prstGeom>
+          <a:ln w="28575">
+            <a:solidFill>
+              <a:srgbClr val="FF0000"/>
+            </a:solidFill>
+            <a:tailEnd type="triangle"/>
+          </a:ln>
+        </p:spPr>
+        <p:style>
+          <a:lnRef idx="1">
+            <a:schemeClr val="accent1"/>
+          </a:lnRef>
+          <a:fillRef idx="0">
+            <a:schemeClr val="accent1"/>
+          </a:fillRef>
+          <a:effectRef idx="0">
+            <a:schemeClr val="accent1"/>
+          </a:effectRef>
+          <a:fontRef idx="minor">
+            <a:schemeClr val="tx1"/>
+          </a:fontRef>
+        </p:style>
+      </p:cxnSp>
+      <p:sp>
+        <p:nvSpPr>
+          <p:cNvPr id="44" name="Arrow: Left 43">
+            <a:extLst>
+              <a:ext uri="{FF2B5EF4-FFF2-40B4-BE49-F238E27FC236}">
+                <a16:creationId xmlns:a16="http://schemas.microsoft.com/office/drawing/2014/main" id="{321D0A99-BCE2-427A-B261-E386ECD6C3A1}"/>
+              </a:ext>
+            </a:extLst>
+          </p:cNvPr>
+          <p:cNvSpPr/>
+          <p:nvPr/>
+        </p:nvSpPr>
+        <p:spPr>
+          <a:xfrm>
+            <a:off x="5425613" y="3930977"/>
+            <a:ext cx="1340769" cy="339365"/>
+          </a:xfrm>
+          <a:prstGeom prst="leftArrow">
+            <a:avLst/>
+          </a:prstGeom>
+        </p:spPr>
+        <p:style>
+          <a:lnRef idx="2">
+            <a:schemeClr val="accent1">
+              <a:shade val="50000"/>
+            </a:schemeClr>
+          </a:lnRef>
+          <a:fillRef idx="1">
+            <a:schemeClr val="accent1"/>
+          </a:fillRef>
+          <a:effectRef idx="0">
+            <a:schemeClr val="accent1"/>
+          </a:effectRef>
+          <a:fontRef idx="minor">
+            <a:schemeClr val="lt1"/>
+          </a:fontRef>
+        </p:style>
+        <p:txBody>
+          <a:bodyPr rtlCol="0" anchor="ctr"/>
+          <a:lstStyle/>
+          <a:p>
+            <a:pPr algn="ctr"/>
+            <a:endParaRPr lang="en-US"/>
+          </a:p>
+        </p:txBody>
+      </p:sp>
+      <p:sp>
+        <p:nvSpPr>
+          <p:cNvPr id="45" name="TextBox 44">
+            <a:extLst>
+              <a:ext uri="{FF2B5EF4-FFF2-40B4-BE49-F238E27FC236}">
+                <a16:creationId xmlns:a16="http://schemas.microsoft.com/office/drawing/2014/main" id="{689ED496-1CF4-45B2-9C90-3FF0A598190C}"/>
+              </a:ext>
+            </a:extLst>
+          </p:cNvPr>
+          <p:cNvSpPr txBox="1"/>
+          <p:nvPr/>
+        </p:nvSpPr>
+        <p:spPr>
+          <a:xfrm>
+            <a:off x="5504073" y="3423206"/>
+            <a:ext cx="1340769" cy="369332"/>
+          </a:xfrm>
+          <a:prstGeom prst="rect">
+            <a:avLst/>
+          </a:prstGeom>
+          <a:noFill/>
+        </p:spPr>
+        <p:txBody>
+          <a:bodyPr wrap="square" rtlCol="0">
+            <a:spAutoFit/>
+          </a:bodyPr>
+          <a:lstStyle/>
+          <a:p>
+            <a:r>
+              <a:rPr lang="en-US" dirty="0"/>
+              <a:t>Prediction</a:t>
+            </a:r>
+          </a:p>
+        </p:txBody>
+      </p:sp>
+      <p:sp>
+        <p:nvSpPr>
+          <p:cNvPr id="46" name="Rectangle 45">
+            <a:extLst>
+              <a:ext uri="{FF2B5EF4-FFF2-40B4-BE49-F238E27FC236}">
+                <a16:creationId xmlns:a16="http://schemas.microsoft.com/office/drawing/2014/main" id="{271DC9F7-A579-486B-9806-5BA07655D00D}"/>
+              </a:ext>
+            </a:extLst>
+          </p:cNvPr>
+          <p:cNvSpPr/>
+          <p:nvPr/>
+        </p:nvSpPr>
+        <p:spPr>
+          <a:xfrm>
+            <a:off x="3440706" y="3551941"/>
+            <a:ext cx="507868" cy="775355"/>
+          </a:xfrm>
+          <a:prstGeom prst="rect">
+            <a:avLst/>
+          </a:prstGeom>
+          <a:noFill/>
+          <a:ln w="57150">
+            <a:solidFill>
+              <a:srgbClr val="FFFF00"/>
+            </a:solidFill>
+          </a:ln>
+        </p:spPr>
+        <p:style>
+          <a:lnRef idx="2">
+            <a:schemeClr val="accent1">
+              <a:shade val="50000"/>
+            </a:schemeClr>
+          </a:lnRef>
+          <a:fillRef idx="1">
+            <a:schemeClr val="accent1"/>
+          </a:fillRef>
+          <a:effectRef idx="0">
+            <a:schemeClr val="accent1"/>
+          </a:effectRef>
+          <a:fontRef idx="minor">
+            <a:schemeClr val="lt1"/>
+          </a:fontRef>
+        </p:style>
+        <p:txBody>
+          <a:bodyPr rtlCol="0" anchor="ctr"/>
+          <a:lstStyle/>
+          <a:p>
+            <a:pPr algn="ctr"/>
+            <a:endParaRPr lang="en-US"/>
+          </a:p>
+        </p:txBody>
+      </p:sp>
+      <p:sp>
+        <p:nvSpPr>
+          <p:cNvPr id="47" name="Rectangle 46">
+            <a:extLst>
+              <a:ext uri="{FF2B5EF4-FFF2-40B4-BE49-F238E27FC236}">
+                <a16:creationId xmlns:a16="http://schemas.microsoft.com/office/drawing/2014/main" id="{44E100A3-1F60-46E8-89AD-615CC76D5FF4}"/>
+              </a:ext>
+            </a:extLst>
+          </p:cNvPr>
+          <p:cNvSpPr/>
+          <p:nvPr/>
+        </p:nvSpPr>
+        <p:spPr>
+          <a:xfrm>
+            <a:off x="3668772" y="3767761"/>
+            <a:ext cx="507868" cy="1096259"/>
+          </a:xfrm>
+          <a:prstGeom prst="rect">
+            <a:avLst/>
+          </a:prstGeom>
+          <a:noFill/>
+          <a:ln w="57150"/>
+        </p:spPr>
+        <p:style>
+          <a:lnRef idx="2">
+            <a:schemeClr val="accent1">
+              <a:shade val="50000"/>
+            </a:schemeClr>
+          </a:lnRef>
+          <a:fillRef idx="1">
+            <a:schemeClr val="accent1"/>
+          </a:fillRef>
+          <a:effectRef idx="0">
+            <a:schemeClr val="accent1"/>
+          </a:effectRef>
+          <a:fontRef idx="minor">
+            <a:schemeClr val="lt1"/>
+          </a:fontRef>
+        </p:style>
+        <p:txBody>
+          <a:bodyPr rtlCol="0" anchor="ctr"/>
+          <a:lstStyle/>
+          <a:p>
+            <a:pPr algn="ctr"/>
+            <a:endParaRPr lang="en-US"/>
+          </a:p>
+        </p:txBody>
+      </p:sp>
+      <p:sp>
+        <p:nvSpPr>
+          <p:cNvPr id="48" name="Rectangle 47">
+            <a:extLst>
+              <a:ext uri="{FF2B5EF4-FFF2-40B4-BE49-F238E27FC236}">
+                <a16:creationId xmlns:a16="http://schemas.microsoft.com/office/drawing/2014/main" id="{8B1520B3-05B3-4AAE-892B-0C252BF5DDBC}"/>
+              </a:ext>
+            </a:extLst>
+          </p:cNvPr>
+          <p:cNvSpPr/>
+          <p:nvPr/>
+        </p:nvSpPr>
+        <p:spPr>
+          <a:xfrm>
+            <a:off x="3247390" y="4666319"/>
+            <a:ext cx="507868" cy="647642"/>
+          </a:xfrm>
+          <a:prstGeom prst="rect">
+            <a:avLst/>
+          </a:prstGeom>
+          <a:noFill/>
+          <a:ln w="57150">
+            <a:solidFill>
+              <a:schemeClr val="accent2">
+                <a:lumMod val="75000"/>
+              </a:schemeClr>
+            </a:solidFill>
+          </a:ln>
+        </p:spPr>
+        <p:style>
+          <a:lnRef idx="2">
+            <a:schemeClr val="accent1">
+              <a:shade val="50000"/>
+            </a:schemeClr>
+          </a:lnRef>
+          <a:fillRef idx="1">
+            <a:schemeClr val="accent1"/>
+          </a:fillRef>
+          <a:effectRef idx="0">
+            <a:schemeClr val="accent1"/>
+          </a:effectRef>
+          <a:fontRef idx="minor">
+            <a:schemeClr val="lt1"/>
+          </a:fontRef>
+        </p:style>
+        <p:txBody>
+          <a:bodyPr rtlCol="0" anchor="ctr"/>
+          <a:lstStyle/>
+          <a:p>
+            <a:pPr algn="ctr"/>
+            <a:endParaRPr lang="en-US"/>
+          </a:p>
+        </p:txBody>
+      </p:sp>
+      <p:sp>
+        <p:nvSpPr>
+          <p:cNvPr id="50" name="Rectangle 49">
+            <a:extLst>
+              <a:ext uri="{FF2B5EF4-FFF2-40B4-BE49-F238E27FC236}">
+                <a16:creationId xmlns:a16="http://schemas.microsoft.com/office/drawing/2014/main" id="{D2679C6C-BC57-4FA6-A8D8-3F7A3A879501}"/>
+              </a:ext>
+            </a:extLst>
+          </p:cNvPr>
+          <p:cNvSpPr/>
+          <p:nvPr/>
+        </p:nvSpPr>
+        <p:spPr>
+          <a:xfrm>
+            <a:off x="3693462" y="4857222"/>
+            <a:ext cx="507868" cy="647642"/>
+          </a:xfrm>
+          <a:prstGeom prst="rect">
+            <a:avLst/>
+          </a:prstGeom>
+          <a:noFill/>
+          <a:ln w="57150">
+            <a:solidFill>
+              <a:srgbClr val="FF0000"/>
+            </a:solidFill>
+          </a:ln>
+        </p:spPr>
+        <p:style>
+          <a:lnRef idx="2">
+            <a:schemeClr val="accent1">
+              <a:shade val="50000"/>
+            </a:schemeClr>
+          </a:lnRef>
+          <a:fillRef idx="1">
+            <a:schemeClr val="accent1"/>
+          </a:fillRef>
+          <a:effectRef idx="0">
+            <a:schemeClr val="accent1"/>
+          </a:effectRef>
+          <a:fontRef idx="minor">
+            <a:schemeClr val="lt1"/>
+          </a:fontRef>
+        </p:style>
+        <p:txBody>
+          <a:bodyPr rtlCol="0" anchor="ctr"/>
+          <a:lstStyle/>
+          <a:p>
+            <a:pPr algn="ctr"/>
+            <a:endParaRPr lang="en-US"/>
+          </a:p>
+        </p:txBody>
+      </p:sp>
+      <p:cxnSp>
+        <p:nvCxnSpPr>
+          <p:cNvPr id="51" name="Straight Arrow Connector 50">
+            <a:extLst>
+              <a:ext uri="{FF2B5EF4-FFF2-40B4-BE49-F238E27FC236}">
+                <a16:creationId xmlns:a16="http://schemas.microsoft.com/office/drawing/2014/main" id="{6E80F547-D08A-44FA-BF40-233FB4FF479E}"/>
+              </a:ext>
+            </a:extLst>
+          </p:cNvPr>
+          <p:cNvCxnSpPr>
+            <a:cxnSpLocks/>
+          </p:cNvCxnSpPr>
+          <p:nvPr/>
+        </p:nvCxnSpPr>
+        <p:spPr>
+          <a:xfrm flipH="1">
+            <a:off x="3290104" y="4990140"/>
+            <a:ext cx="185963" cy="108525"/>
+          </a:xfrm>
+          <a:prstGeom prst="straightConnector1">
+            <a:avLst/>
+          </a:prstGeom>
+          <a:ln w="28575">
+            <a:solidFill>
+              <a:schemeClr val="accent2">
+                <a:lumMod val="75000"/>
+              </a:schemeClr>
+            </a:solidFill>
+            <a:tailEnd type="triangle"/>
+          </a:ln>
+        </p:spPr>
+        <p:style>
+          <a:lnRef idx="1">
+            <a:schemeClr val="accent1"/>
+          </a:lnRef>
+          <a:fillRef idx="0">
+            <a:schemeClr val="accent1"/>
+          </a:fillRef>
+          <a:effectRef idx="0">
+            <a:schemeClr val="accent1"/>
+          </a:effectRef>
+          <a:fontRef idx="minor">
+            <a:schemeClr val="tx1"/>
+          </a:fontRef>
+        </p:style>
+      </p:cxnSp>
+      <p:cxnSp>
+        <p:nvCxnSpPr>
+          <p:cNvPr id="53" name="Straight Arrow Connector 52">
+            <a:extLst>
+              <a:ext uri="{FF2B5EF4-FFF2-40B4-BE49-F238E27FC236}">
+                <a16:creationId xmlns:a16="http://schemas.microsoft.com/office/drawing/2014/main" id="{1044C673-C82B-47E4-8248-61F6E27DBB16}"/>
+              </a:ext>
+            </a:extLst>
+          </p:cNvPr>
+          <p:cNvCxnSpPr>
+            <a:cxnSpLocks/>
+          </p:cNvCxnSpPr>
+          <p:nvPr/>
+        </p:nvCxnSpPr>
+        <p:spPr>
+          <a:xfrm>
+            <a:off x="3972653" y="5160115"/>
+            <a:ext cx="0" cy="233831"/>
+          </a:xfrm>
+          <a:prstGeom prst="straightConnector1">
+            <a:avLst/>
+          </a:prstGeom>
+          <a:ln w="28575">
+            <a:solidFill>
+              <a:srgbClr val="FF0000"/>
+            </a:solidFill>
+            <a:tailEnd type="triangle"/>
+          </a:ln>
+        </p:spPr>
+        <p:style>
+          <a:lnRef idx="1">
+            <a:schemeClr val="accent1"/>
+          </a:lnRef>
+          <a:fillRef idx="0">
+            <a:schemeClr val="accent1"/>
+          </a:fillRef>
+          <a:effectRef idx="0">
+            <a:schemeClr val="accent1"/>
+          </a:effectRef>
+          <a:fontRef idx="minor">
+            <a:schemeClr val="tx1"/>
+          </a:fontRef>
+        </p:style>
+      </p:cxnSp>
+      <p:cxnSp>
+        <p:nvCxnSpPr>
+          <p:cNvPr id="55" name="Straight Arrow Connector 54">
+            <a:extLst>
+              <a:ext uri="{FF2B5EF4-FFF2-40B4-BE49-F238E27FC236}">
+                <a16:creationId xmlns:a16="http://schemas.microsoft.com/office/drawing/2014/main" id="{DC732DA0-BFC7-44E9-9B9E-033D1AB4C4E4}"/>
+              </a:ext>
+            </a:extLst>
+          </p:cNvPr>
+          <p:cNvCxnSpPr>
+            <a:cxnSpLocks/>
+          </p:cNvCxnSpPr>
+          <p:nvPr/>
+        </p:nvCxnSpPr>
+        <p:spPr>
+          <a:xfrm flipH="1">
+            <a:off x="3243535" y="3939618"/>
+            <a:ext cx="404266" cy="161041"/>
+          </a:xfrm>
+          <a:prstGeom prst="straightConnector1">
+            <a:avLst/>
+          </a:prstGeom>
+          <a:ln w="28575">
+            <a:solidFill>
+              <a:srgbClr val="FFFF00"/>
+            </a:solidFill>
+            <a:tailEnd type="triangle"/>
+          </a:ln>
+        </p:spPr>
+        <p:style>
+          <a:lnRef idx="1">
+            <a:schemeClr val="accent1"/>
+          </a:lnRef>
+          <a:fillRef idx="0">
+            <a:schemeClr val="accent1"/>
+          </a:fillRef>
+          <a:effectRef idx="0">
+            <a:schemeClr val="accent1"/>
+          </a:effectRef>
+          <a:fontRef idx="minor">
+            <a:schemeClr val="tx1"/>
+          </a:fontRef>
+        </p:style>
+      </p:cxnSp>
+      <p:cxnSp>
+        <p:nvCxnSpPr>
+          <p:cNvPr id="57" name="Straight Arrow Connector 56">
+            <a:extLst>
+              <a:ext uri="{FF2B5EF4-FFF2-40B4-BE49-F238E27FC236}">
+                <a16:creationId xmlns:a16="http://schemas.microsoft.com/office/drawing/2014/main" id="{A87B6493-BE04-47FD-BAB3-1AC01C551A59}"/>
+              </a:ext>
+            </a:extLst>
+          </p:cNvPr>
+          <p:cNvCxnSpPr>
+            <a:cxnSpLocks/>
+          </p:cNvCxnSpPr>
+          <p:nvPr/>
+        </p:nvCxnSpPr>
+        <p:spPr>
+          <a:xfrm flipH="1" flipV="1">
+            <a:off x="3408601" y="4394906"/>
+            <a:ext cx="456421" cy="42762"/>
+          </a:xfrm>
+          <a:prstGeom prst="straightConnector1">
+            <a:avLst/>
+          </a:prstGeom>
+          <a:ln w="28575">
+            <a:solidFill>
+              <a:srgbClr val="0070C0"/>
+            </a:solidFill>
+            <a:tailEnd type="triangle"/>
+          </a:ln>
+        </p:spPr>
+        <p:style>
+          <a:lnRef idx="1">
+            <a:schemeClr val="accent1"/>
+          </a:lnRef>
+          <a:fillRef idx="0">
+            <a:schemeClr val="accent1"/>
+          </a:fillRef>
+          <a:effectRef idx="0">
+            <a:schemeClr val="accent1"/>
+          </a:effectRef>
+          <a:fontRef idx="minor">
+            <a:schemeClr val="tx1"/>
+          </a:fontRef>
+        </p:style>
+      </p:cxnSp>
+      <p:sp>
+        <p:nvSpPr>
+          <p:cNvPr id="60" name="TextBox 59">
+            <a:extLst>
+              <a:ext uri="{FF2B5EF4-FFF2-40B4-BE49-F238E27FC236}">
+                <a16:creationId xmlns:a16="http://schemas.microsoft.com/office/drawing/2014/main" id="{22E8DBB1-B7DD-4FE8-B437-3B569F9618F4}"/>
+              </a:ext>
+            </a:extLst>
+          </p:cNvPr>
+          <p:cNvSpPr txBox="1"/>
+          <p:nvPr/>
+        </p:nvSpPr>
+        <p:spPr>
+          <a:xfrm>
+            <a:off x="1892985" y="1838821"/>
+            <a:ext cx="2980199" cy="523220"/>
+          </a:xfrm>
+          <a:prstGeom prst="rect">
+            <a:avLst/>
+          </a:prstGeom>
+          <a:noFill/>
+        </p:spPr>
+        <p:txBody>
+          <a:bodyPr wrap="square" rtlCol="0">
+            <a:spAutoFit/>
+          </a:bodyPr>
+          <a:lstStyle/>
+          <a:p>
+            <a:r>
+              <a:rPr lang="en-US" sz="2800" dirty="0"/>
+              <a:t>Predicted Particles</a:t>
+            </a:r>
+          </a:p>
+        </p:txBody>
+      </p:sp>
+    </p:spTree>
+    <p:extLst>
+      <p:ext uri="{BB962C8B-B14F-4D97-AF65-F5344CB8AC3E}">
+        <p14:creationId xmlns:p14="http://schemas.microsoft.com/office/powerpoint/2010/main" val="1838670667"/>
+      </p:ext>
+    </p:extLst>
+  </p:cSld>
+  <p:clrMapOvr>
+    <a:masterClrMapping/>
+  </p:clrMapOvr>
+</p:sld>
+</file>
+
+<file path=ppt/slides/slide19.xml><?xml version="1.0" encoding="utf-8"?>
+<p:sld xmlns:a="http://schemas.openxmlformats.org/drawingml/2006/main" xmlns:r="http://schemas.openxmlformats.org/officeDocument/2006/relationships" xmlns:p="http://schemas.openxmlformats.org/presentationml/2006/main">
+  <p:cSld>
+    <p:spTree>
+      <p:nvGrpSpPr>
+        <p:cNvPr id="1" name=""/>
+        <p:cNvGrpSpPr/>
+        <p:nvPr/>
+      </p:nvGrpSpPr>
+      <p:grpSpPr>
+        <a:xfrm>
+          <a:off x="0" y="0"/>
+          <a:ext cx="0" cy="0"/>
+          <a:chOff x="0" y="0"/>
+          <a:chExt cx="0" cy="0"/>
+        </a:xfrm>
+      </p:grpSpPr>
+      <p:pic>
+        <p:nvPicPr>
+          <p:cNvPr id="49" name="Content Placeholder 7" descr="A picture containing building, outdoor, outdoor object&#10;&#10;Description automatically generated">
+            <a:extLst>
+              <a:ext uri="{FF2B5EF4-FFF2-40B4-BE49-F238E27FC236}">
+                <a16:creationId xmlns:a16="http://schemas.microsoft.com/office/drawing/2014/main" id="{1B8866DF-FACF-4E14-8680-BA2E9DCD645E}"/>
+              </a:ext>
+            </a:extLst>
+          </p:cNvPr>
+          <p:cNvPicPr>
+            <a:picLocks noChangeAspect="1"/>
+          </p:cNvPicPr>
+          <p:nvPr/>
+        </p:nvPicPr>
+        <p:blipFill>
+          <a:blip r:embed="rId3">
+            <a:extLst>
+              <a:ext uri="{28A0092B-C50C-407E-A947-70E740481C1C}">
+                <a14:useLocalDpi xmlns:a14="http://schemas.microsoft.com/office/drawing/2010/main" val="0"/>
+              </a:ext>
+            </a:extLst>
+          </a:blip>
+          <a:stretch>
+            <a:fillRect/>
+          </a:stretch>
+        </p:blipFill>
+        <p:spPr>
+          <a:xfrm>
+            <a:off x="1351766" y="2548788"/>
+            <a:ext cx="3876676" cy="3171826"/>
+          </a:xfrm>
+          <a:prstGeom prst="rect">
+            <a:avLst/>
+          </a:prstGeom>
+          <a:ln>
+            <a:noFill/>
+          </a:ln>
+        </p:spPr>
+      </p:pic>
+      <p:sp>
+        <p:nvSpPr>
+          <p:cNvPr id="2" name="Date Placeholder 1">
+            <a:extLst>
+              <a:ext uri="{FF2B5EF4-FFF2-40B4-BE49-F238E27FC236}">
+                <a16:creationId xmlns:a16="http://schemas.microsoft.com/office/drawing/2014/main" id="{8AABA0BB-0402-4373-859D-6F13BC460170}"/>
+              </a:ext>
+            </a:extLst>
+          </p:cNvPr>
+          <p:cNvSpPr>
+            <a:spLocks noGrp="1"/>
+          </p:cNvSpPr>
+          <p:nvPr>
+            <p:ph type="dt" sz="half" idx="10"/>
+          </p:nvPr>
+        </p:nvSpPr>
+        <p:spPr/>
+        <p:txBody>
+          <a:bodyPr/>
+          <a:lstStyle/>
+          <a:p>
+            <a:fld id="{F736EC4A-E5B7-42C2-9943-4D2477F0E2BA}" type="datetime1">
+              <a:rPr lang="en-US" smtClean="0"/>
+              <a:t>2/16/2022</a:t>
+            </a:fld>
+            <a:endParaRPr lang="en-US" dirty="0"/>
+          </a:p>
+        </p:txBody>
+      </p:sp>
+      <p:sp>
+        <p:nvSpPr>
+          <p:cNvPr id="3" name="Footer Placeholder 2">
+            <a:extLst>
+              <a:ext uri="{FF2B5EF4-FFF2-40B4-BE49-F238E27FC236}">
+                <a16:creationId xmlns:a16="http://schemas.microsoft.com/office/drawing/2014/main" id="{4CA38CF6-425B-4615-A765-9C6F53492D09}"/>
+              </a:ext>
+            </a:extLst>
+          </p:cNvPr>
+          <p:cNvSpPr>
+            <a:spLocks noGrp="1"/>
+          </p:cNvSpPr>
+          <p:nvPr>
+            <p:ph type="ftr" sz="quarter" idx="11"/>
+          </p:nvPr>
+        </p:nvSpPr>
+        <p:spPr/>
+        <p:txBody>
+          <a:bodyPr/>
+          <a:lstStyle/>
+          <a:p>
+            <a:r>
+              <a:rPr lang="en-US"/>
+              <a:t>Or Sagiv &amp; Etai Sella</a:t>
+            </a:r>
+            <a:endParaRPr lang="en-US" dirty="0"/>
+          </a:p>
+        </p:txBody>
+      </p:sp>
+      <p:sp>
+        <p:nvSpPr>
+          <p:cNvPr id="4" name="Slide Number Placeholder 3">
+            <a:extLst>
+              <a:ext uri="{FF2B5EF4-FFF2-40B4-BE49-F238E27FC236}">
+                <a16:creationId xmlns:a16="http://schemas.microsoft.com/office/drawing/2014/main" id="{6C620BA3-F0DC-4BB6-9276-6EBFBDB62FBC}"/>
+              </a:ext>
+            </a:extLst>
+          </p:cNvPr>
+          <p:cNvSpPr>
+            <a:spLocks noGrp="1"/>
+          </p:cNvSpPr>
+          <p:nvPr>
+            <p:ph type="sldNum" sz="quarter" idx="12"/>
+          </p:nvPr>
+        </p:nvSpPr>
+        <p:spPr/>
+        <p:txBody>
+          <a:bodyPr/>
+          <a:lstStyle/>
+          <a:p>
+            <a:fld id="{C629165E-D59B-453D-B763-34340D7036F6}" type="slidenum">
+              <a:rPr lang="en-US" smtClean="0"/>
+              <a:t>19</a:t>
+            </a:fld>
+            <a:endParaRPr lang="en-US" dirty="0"/>
+          </a:p>
+        </p:txBody>
+      </p:sp>
+      <p:pic>
+        <p:nvPicPr>
+          <p:cNvPr id="8" name="Content Placeholder 7" descr="A picture containing building, outdoor, outdoor object&#10;&#10;Description automatically generated">
+            <a:extLst>
+              <a:ext uri="{FF2B5EF4-FFF2-40B4-BE49-F238E27FC236}">
+                <a16:creationId xmlns:a16="http://schemas.microsoft.com/office/drawing/2014/main" id="{E2F3B7F5-A39D-4645-8306-3F42525DCFD4}"/>
+              </a:ext>
+            </a:extLst>
+          </p:cNvPr>
+          <p:cNvPicPr>
+            <a:picLocks noGrp="1" noChangeAspect="1"/>
+          </p:cNvPicPr>
+          <p:nvPr>
+            <p:ph idx="1"/>
+          </p:nvPr>
+        </p:nvPicPr>
+        <p:blipFill>
+          <a:blip r:embed="rId3">
+            <a:extLst>
+              <a:ext uri="{28A0092B-C50C-407E-A947-70E740481C1C}">
+                <a14:useLocalDpi xmlns:a14="http://schemas.microsoft.com/office/drawing/2010/main" val="0"/>
+              </a:ext>
+            </a:extLst>
+          </a:blip>
+          <a:stretch>
+            <a:fillRect/>
+          </a:stretch>
+        </p:blipFill>
+        <p:spPr>
+          <a:xfrm>
+            <a:off x="6923303" y="2548788"/>
+            <a:ext cx="3876676" cy="3171826"/>
+          </a:xfrm>
+          <a:ln w="12700"/>
+        </p:spPr>
+      </p:pic>
+      <p:sp>
+        <p:nvSpPr>
+          <p:cNvPr id="6" name="Title 5">
+            <a:extLst>
+              <a:ext uri="{FF2B5EF4-FFF2-40B4-BE49-F238E27FC236}">
+                <a16:creationId xmlns:a16="http://schemas.microsoft.com/office/drawing/2014/main" id="{5F36854F-5562-4B15-A113-787D0B27EA0F}"/>
+              </a:ext>
+            </a:extLst>
+          </p:cNvPr>
+          <p:cNvSpPr>
+            <a:spLocks noGrp="1"/>
+          </p:cNvSpPr>
+          <p:nvPr>
+            <p:ph type="title"/>
+          </p:nvPr>
+        </p:nvSpPr>
+        <p:spPr/>
+        <p:txBody>
+          <a:bodyPr/>
+          <a:lstStyle/>
+          <a:p>
+            <a:r>
+              <a:rPr lang="en-US" dirty="0"/>
+              <a:t>Particle Filter</a:t>
+            </a:r>
+          </a:p>
+        </p:txBody>
+      </p:sp>
+      <p:sp>
+        <p:nvSpPr>
+          <p:cNvPr id="46" name="Rectangle 45">
+            <a:extLst>
+              <a:ext uri="{FF2B5EF4-FFF2-40B4-BE49-F238E27FC236}">
+                <a16:creationId xmlns:a16="http://schemas.microsoft.com/office/drawing/2014/main" id="{271DC9F7-A579-486B-9806-5BA07655D00D}"/>
+              </a:ext>
+            </a:extLst>
+          </p:cNvPr>
+          <p:cNvSpPr/>
+          <p:nvPr/>
+        </p:nvSpPr>
+        <p:spPr>
+          <a:xfrm>
+            <a:off x="9087362" y="3432919"/>
+            <a:ext cx="507868" cy="775355"/>
+          </a:xfrm>
+          <a:prstGeom prst="rect">
+            <a:avLst/>
+          </a:prstGeom>
+          <a:noFill/>
+          <a:ln w="38100">
+            <a:solidFill>
+              <a:srgbClr val="FFFF00"/>
+            </a:solidFill>
+          </a:ln>
+        </p:spPr>
+        <p:style>
+          <a:lnRef idx="2">
+            <a:schemeClr val="accent1">
+              <a:shade val="50000"/>
+            </a:schemeClr>
+          </a:lnRef>
+          <a:fillRef idx="1">
+            <a:schemeClr val="accent1"/>
+          </a:fillRef>
+          <a:effectRef idx="0">
+            <a:schemeClr val="accent1"/>
+          </a:effectRef>
+          <a:fontRef idx="minor">
+            <a:schemeClr val="lt1"/>
+          </a:fontRef>
+        </p:style>
+        <p:txBody>
+          <a:bodyPr rtlCol="0" anchor="ctr"/>
+          <a:lstStyle/>
+          <a:p>
+            <a:pPr algn="ctr"/>
+            <a:endParaRPr lang="en-US"/>
+          </a:p>
+        </p:txBody>
+      </p:sp>
+      <p:sp>
+        <p:nvSpPr>
+          <p:cNvPr id="47" name="Rectangle 46">
+            <a:extLst>
+              <a:ext uri="{FF2B5EF4-FFF2-40B4-BE49-F238E27FC236}">
+                <a16:creationId xmlns:a16="http://schemas.microsoft.com/office/drawing/2014/main" id="{44E100A3-1F60-46E8-89AD-615CC76D5FF4}"/>
+              </a:ext>
+            </a:extLst>
+          </p:cNvPr>
+          <p:cNvSpPr/>
+          <p:nvPr/>
+        </p:nvSpPr>
+        <p:spPr>
+          <a:xfrm>
+            <a:off x="9315428" y="3648739"/>
+            <a:ext cx="507868" cy="1096259"/>
+          </a:xfrm>
+          <a:prstGeom prst="rect">
+            <a:avLst/>
+          </a:prstGeom>
+          <a:noFill/>
+          <a:ln w="76200"/>
+        </p:spPr>
+        <p:style>
+          <a:lnRef idx="2">
+            <a:schemeClr val="accent1">
+              <a:shade val="50000"/>
+            </a:schemeClr>
+          </a:lnRef>
+          <a:fillRef idx="1">
+            <a:schemeClr val="accent1"/>
+          </a:fillRef>
+          <a:effectRef idx="0">
+            <a:schemeClr val="accent1"/>
+          </a:effectRef>
+          <a:fontRef idx="minor">
+            <a:schemeClr val="lt1"/>
+          </a:fontRef>
+        </p:style>
+        <p:txBody>
+          <a:bodyPr rtlCol="0" anchor="ctr"/>
+          <a:lstStyle/>
+          <a:p>
+            <a:pPr algn="ctr"/>
+            <a:endParaRPr lang="en-US"/>
+          </a:p>
+        </p:txBody>
+      </p:sp>
+      <p:sp>
+        <p:nvSpPr>
+          <p:cNvPr id="48" name="Rectangle 47">
+            <a:extLst>
+              <a:ext uri="{FF2B5EF4-FFF2-40B4-BE49-F238E27FC236}">
+                <a16:creationId xmlns:a16="http://schemas.microsoft.com/office/drawing/2014/main" id="{8B1520B3-05B3-4AAE-892B-0C252BF5DDBC}"/>
+              </a:ext>
+            </a:extLst>
+          </p:cNvPr>
+          <p:cNvSpPr/>
+          <p:nvPr/>
+        </p:nvSpPr>
+        <p:spPr>
+          <a:xfrm>
+            <a:off x="8894046" y="4547297"/>
+            <a:ext cx="507868" cy="647642"/>
+          </a:xfrm>
+          <a:prstGeom prst="rect">
+            <a:avLst/>
+          </a:prstGeom>
+          <a:noFill/>
+          <a:ln w="28575">
+            <a:solidFill>
+              <a:schemeClr val="accent2">
+                <a:lumMod val="75000"/>
+              </a:schemeClr>
+            </a:solidFill>
+          </a:ln>
+        </p:spPr>
+        <p:style>
+          <a:lnRef idx="2">
+            <a:schemeClr val="accent1">
+              <a:shade val="50000"/>
+            </a:schemeClr>
+          </a:lnRef>
+          <a:fillRef idx="1">
+            <a:schemeClr val="accent1"/>
+          </a:fillRef>
+          <a:effectRef idx="0">
+            <a:schemeClr val="accent1"/>
+          </a:effectRef>
+          <a:fontRef idx="minor">
+            <a:schemeClr val="lt1"/>
+          </a:fontRef>
+        </p:style>
+        <p:txBody>
+          <a:bodyPr rtlCol="0" anchor="ctr"/>
+          <a:lstStyle/>
+          <a:p>
+            <a:pPr algn="ctr"/>
+            <a:endParaRPr lang="en-US" dirty="0"/>
+          </a:p>
+        </p:txBody>
+      </p:sp>
+      <p:sp>
+        <p:nvSpPr>
+          <p:cNvPr id="50" name="Rectangle 49">
+            <a:extLst>
+              <a:ext uri="{FF2B5EF4-FFF2-40B4-BE49-F238E27FC236}">
+                <a16:creationId xmlns:a16="http://schemas.microsoft.com/office/drawing/2014/main" id="{D2679C6C-BC57-4FA6-A8D8-3F7A3A879501}"/>
+              </a:ext>
+            </a:extLst>
+          </p:cNvPr>
+          <p:cNvSpPr/>
+          <p:nvPr/>
+        </p:nvSpPr>
+        <p:spPr>
+          <a:xfrm>
+            <a:off x="9340118" y="4738200"/>
+            <a:ext cx="507868" cy="647642"/>
+          </a:xfrm>
+          <a:prstGeom prst="rect">
+            <a:avLst/>
+          </a:prstGeom>
+          <a:noFill/>
+          <a:ln w="3175">
+            <a:solidFill>
+              <a:srgbClr val="FF0000"/>
+            </a:solidFill>
+          </a:ln>
+        </p:spPr>
+        <p:style>
+          <a:lnRef idx="2">
+            <a:schemeClr val="accent1">
+              <a:shade val="50000"/>
+            </a:schemeClr>
+          </a:lnRef>
+          <a:fillRef idx="1">
+            <a:schemeClr val="accent1"/>
+          </a:fillRef>
+          <a:effectRef idx="0">
+            <a:schemeClr val="accent1"/>
+          </a:effectRef>
+          <a:fontRef idx="minor">
+            <a:schemeClr val="lt1"/>
+          </a:fontRef>
+        </p:style>
+        <p:txBody>
+          <a:bodyPr rtlCol="0" anchor="ctr"/>
+          <a:lstStyle/>
+          <a:p>
+            <a:pPr algn="ctr"/>
+            <a:endParaRPr lang="en-US"/>
+          </a:p>
+        </p:txBody>
+      </p:sp>
+      <p:cxnSp>
+        <p:nvCxnSpPr>
+          <p:cNvPr id="51" name="Straight Arrow Connector 50">
+            <a:extLst>
+              <a:ext uri="{FF2B5EF4-FFF2-40B4-BE49-F238E27FC236}">
+                <a16:creationId xmlns:a16="http://schemas.microsoft.com/office/drawing/2014/main" id="{6E80F547-D08A-44FA-BF40-233FB4FF479E}"/>
+              </a:ext>
+            </a:extLst>
+          </p:cNvPr>
+          <p:cNvCxnSpPr>
+            <a:cxnSpLocks/>
+          </p:cNvCxnSpPr>
+          <p:nvPr/>
+        </p:nvCxnSpPr>
+        <p:spPr>
+          <a:xfrm flipH="1">
+            <a:off x="8936760" y="4871118"/>
+            <a:ext cx="185963" cy="108525"/>
+          </a:xfrm>
+          <a:prstGeom prst="straightConnector1">
+            <a:avLst/>
+          </a:prstGeom>
+          <a:ln w="28575">
+            <a:solidFill>
+              <a:schemeClr val="accent2">
+                <a:lumMod val="75000"/>
+              </a:schemeClr>
+            </a:solidFill>
+            <a:tailEnd type="triangle"/>
+          </a:ln>
+        </p:spPr>
+        <p:style>
+          <a:lnRef idx="1">
+            <a:schemeClr val="accent1"/>
+          </a:lnRef>
+          <a:fillRef idx="0">
+            <a:schemeClr val="accent1"/>
+          </a:fillRef>
+          <a:effectRef idx="0">
+            <a:schemeClr val="accent1"/>
+          </a:effectRef>
+          <a:fontRef idx="minor">
+            <a:schemeClr val="tx1"/>
+          </a:fontRef>
+        </p:style>
+      </p:cxnSp>
+      <p:cxnSp>
+        <p:nvCxnSpPr>
+          <p:cNvPr id="53" name="Straight Arrow Connector 52">
+            <a:extLst>
+              <a:ext uri="{FF2B5EF4-FFF2-40B4-BE49-F238E27FC236}">
+                <a16:creationId xmlns:a16="http://schemas.microsoft.com/office/drawing/2014/main" id="{1044C673-C82B-47E4-8248-61F6E27DBB16}"/>
+              </a:ext>
+            </a:extLst>
+          </p:cNvPr>
+          <p:cNvCxnSpPr>
+            <a:cxnSpLocks/>
+          </p:cNvCxnSpPr>
+          <p:nvPr/>
+        </p:nvCxnSpPr>
+        <p:spPr>
+          <a:xfrm>
+            <a:off x="9619309" y="5041093"/>
+            <a:ext cx="0" cy="233831"/>
+          </a:xfrm>
+          <a:prstGeom prst="straightConnector1">
+            <a:avLst/>
+          </a:prstGeom>
+          <a:ln w="28575">
+            <a:solidFill>
+              <a:srgbClr val="FF0000"/>
+            </a:solidFill>
+            <a:tailEnd type="triangle"/>
+          </a:ln>
+        </p:spPr>
+        <p:style>
+          <a:lnRef idx="1">
+            <a:schemeClr val="accent1"/>
+          </a:lnRef>
+          <a:fillRef idx="0">
+            <a:schemeClr val="accent1"/>
+          </a:fillRef>
+          <a:effectRef idx="0">
+            <a:schemeClr val="accent1"/>
+          </a:effectRef>
+          <a:fontRef idx="minor">
+            <a:schemeClr val="tx1"/>
+          </a:fontRef>
+        </p:style>
+      </p:cxnSp>
+      <p:cxnSp>
+        <p:nvCxnSpPr>
+          <p:cNvPr id="55" name="Straight Arrow Connector 54">
+            <a:extLst>
+              <a:ext uri="{FF2B5EF4-FFF2-40B4-BE49-F238E27FC236}">
+                <a16:creationId xmlns:a16="http://schemas.microsoft.com/office/drawing/2014/main" id="{DC732DA0-BFC7-44E9-9B9E-033D1AB4C4E4}"/>
+              </a:ext>
+            </a:extLst>
+          </p:cNvPr>
+          <p:cNvCxnSpPr>
+            <a:cxnSpLocks/>
+          </p:cNvCxnSpPr>
+          <p:nvPr/>
+        </p:nvCxnSpPr>
+        <p:spPr>
+          <a:xfrm flipH="1">
+            <a:off x="8890191" y="3820596"/>
+            <a:ext cx="404266" cy="161041"/>
+          </a:xfrm>
+          <a:prstGeom prst="straightConnector1">
+            <a:avLst/>
+          </a:prstGeom>
+          <a:ln w="28575">
+            <a:solidFill>
+              <a:srgbClr val="FFFF00"/>
+            </a:solidFill>
+            <a:tailEnd type="triangle"/>
+          </a:ln>
+        </p:spPr>
+        <p:style>
+          <a:lnRef idx="1">
+            <a:schemeClr val="accent1"/>
+          </a:lnRef>
+          <a:fillRef idx="0">
+            <a:schemeClr val="accent1"/>
+          </a:fillRef>
+          <a:effectRef idx="0">
+            <a:schemeClr val="accent1"/>
+          </a:effectRef>
+          <a:fontRef idx="minor">
+            <a:schemeClr val="tx1"/>
+          </a:fontRef>
+        </p:style>
+      </p:cxnSp>
+      <p:cxnSp>
+        <p:nvCxnSpPr>
+          <p:cNvPr id="57" name="Straight Arrow Connector 56">
+            <a:extLst>
+              <a:ext uri="{FF2B5EF4-FFF2-40B4-BE49-F238E27FC236}">
+                <a16:creationId xmlns:a16="http://schemas.microsoft.com/office/drawing/2014/main" id="{A87B6493-BE04-47FD-BAB3-1AC01C551A59}"/>
+              </a:ext>
+            </a:extLst>
+          </p:cNvPr>
+          <p:cNvCxnSpPr>
+            <a:cxnSpLocks/>
+          </p:cNvCxnSpPr>
+          <p:nvPr/>
+        </p:nvCxnSpPr>
+        <p:spPr>
+          <a:xfrm flipH="1" flipV="1">
+            <a:off x="9055257" y="4275884"/>
+            <a:ext cx="456421" cy="42762"/>
+          </a:xfrm>
+          <a:prstGeom prst="straightConnector1">
+            <a:avLst/>
+          </a:prstGeom>
+          <a:ln w="28575">
+            <a:solidFill>
+              <a:srgbClr val="0070C0"/>
+            </a:solidFill>
+            <a:tailEnd type="triangle"/>
+          </a:ln>
+        </p:spPr>
+        <p:style>
+          <a:lnRef idx="1">
+            <a:schemeClr val="accent1"/>
+          </a:lnRef>
+          <a:fillRef idx="0">
+            <a:schemeClr val="accent1"/>
+          </a:fillRef>
+          <a:effectRef idx="0">
+            <a:schemeClr val="accent1"/>
+          </a:effectRef>
+          <a:fontRef idx="minor">
+            <a:schemeClr val="tx1"/>
+          </a:fontRef>
+        </p:style>
+      </p:cxnSp>
+      <p:sp>
+        <p:nvSpPr>
+          <p:cNvPr id="60" name="TextBox 59">
+            <a:extLst>
+              <a:ext uri="{FF2B5EF4-FFF2-40B4-BE49-F238E27FC236}">
+                <a16:creationId xmlns:a16="http://schemas.microsoft.com/office/drawing/2014/main" id="{22E8DBB1-B7DD-4FE8-B437-3B569F9618F4}"/>
+              </a:ext>
+            </a:extLst>
+          </p:cNvPr>
+          <p:cNvSpPr txBox="1"/>
+          <p:nvPr/>
+        </p:nvSpPr>
+        <p:spPr>
+          <a:xfrm>
+            <a:off x="6882249" y="1608877"/>
+            <a:ext cx="3958784" cy="892552"/>
+          </a:xfrm>
+          <a:prstGeom prst="rect">
+            <a:avLst/>
+          </a:prstGeom>
+          <a:noFill/>
+        </p:spPr>
+        <p:txBody>
+          <a:bodyPr wrap="square" rtlCol="0">
+            <a:spAutoFit/>
+          </a:bodyPr>
+          <a:lstStyle/>
+          <a:p>
+            <a:pPr algn="ctr"/>
+            <a:r>
+              <a:rPr lang="en-US" sz="2800" dirty="0"/>
+              <a:t>Weighted Particles</a:t>
+            </a:r>
+          </a:p>
+          <a:p>
+            <a:pPr algn="ctr"/>
+            <a:r>
+              <a:rPr lang="en-US" sz="2400" dirty="0"/>
+              <a:t>(represented by width)</a:t>
+            </a:r>
+          </a:p>
+        </p:txBody>
+      </p:sp>
+      <p:sp>
+        <p:nvSpPr>
+          <p:cNvPr id="28" name="Arrow: Left 27">
+            <a:extLst>
+              <a:ext uri="{FF2B5EF4-FFF2-40B4-BE49-F238E27FC236}">
+                <a16:creationId xmlns:a16="http://schemas.microsoft.com/office/drawing/2014/main" id="{0F513E9E-BA33-4C92-82E5-794C15601DC1}"/>
+              </a:ext>
+            </a:extLst>
+          </p:cNvPr>
+          <p:cNvSpPr/>
+          <p:nvPr/>
+        </p:nvSpPr>
+        <p:spPr>
+          <a:xfrm>
+            <a:off x="5413218" y="3936519"/>
+            <a:ext cx="1340769" cy="339365"/>
+          </a:xfrm>
+          <a:prstGeom prst="leftArrow">
+            <a:avLst/>
+          </a:prstGeom>
+        </p:spPr>
+        <p:style>
+          <a:lnRef idx="2">
+            <a:schemeClr val="accent1">
+              <a:shade val="50000"/>
+            </a:schemeClr>
+          </a:lnRef>
+          <a:fillRef idx="1">
+            <a:schemeClr val="accent1"/>
+          </a:fillRef>
+          <a:effectRef idx="0">
+            <a:schemeClr val="accent1"/>
+          </a:effectRef>
+          <a:fontRef idx="minor">
+            <a:schemeClr val="lt1"/>
+          </a:fontRef>
+        </p:style>
+        <p:txBody>
+          <a:bodyPr rtlCol="0" anchor="ctr"/>
+          <a:lstStyle/>
+          <a:p>
+            <a:pPr algn="ctr"/>
+            <a:endParaRPr lang="en-US"/>
+          </a:p>
+        </p:txBody>
+      </p:sp>
+      <p:sp>
+        <p:nvSpPr>
+          <p:cNvPr id="33" name="TextBox 32">
+            <a:extLst>
+              <a:ext uri="{FF2B5EF4-FFF2-40B4-BE49-F238E27FC236}">
+                <a16:creationId xmlns:a16="http://schemas.microsoft.com/office/drawing/2014/main" id="{325BB346-BC42-4345-A2A7-16A6BB400F9C}"/>
+              </a:ext>
+            </a:extLst>
+          </p:cNvPr>
+          <p:cNvSpPr txBox="1"/>
+          <p:nvPr/>
+        </p:nvSpPr>
+        <p:spPr>
+          <a:xfrm>
+            <a:off x="5491678" y="3428748"/>
+            <a:ext cx="1340769" cy="369332"/>
+          </a:xfrm>
+          <a:prstGeom prst="rect">
+            <a:avLst/>
+          </a:prstGeom>
+          <a:noFill/>
+        </p:spPr>
+        <p:txBody>
+          <a:bodyPr wrap="square" rtlCol="0">
+            <a:spAutoFit/>
+          </a:bodyPr>
+          <a:lstStyle/>
+          <a:p>
+            <a:r>
+              <a:rPr lang="en-US" dirty="0"/>
+              <a:t>Sampling</a:t>
+            </a:r>
+          </a:p>
+        </p:txBody>
+      </p:sp>
+      <p:sp>
+        <p:nvSpPr>
+          <p:cNvPr id="36" name="TextBox 35">
+            <a:extLst>
+              <a:ext uri="{FF2B5EF4-FFF2-40B4-BE49-F238E27FC236}">
+                <a16:creationId xmlns:a16="http://schemas.microsoft.com/office/drawing/2014/main" id="{2C5D5BCA-8492-4251-A915-113DD908DFFE}"/>
+              </a:ext>
+            </a:extLst>
+          </p:cNvPr>
+          <p:cNvSpPr txBox="1"/>
+          <p:nvPr/>
+        </p:nvSpPr>
+        <p:spPr>
+          <a:xfrm>
+            <a:off x="1600502" y="1817405"/>
+            <a:ext cx="3512237" cy="523220"/>
+          </a:xfrm>
+          <a:prstGeom prst="rect">
+            <a:avLst/>
+          </a:prstGeom>
+          <a:noFill/>
+        </p:spPr>
+        <p:txBody>
+          <a:bodyPr wrap="square" rtlCol="0">
+            <a:spAutoFit/>
+          </a:bodyPr>
+          <a:lstStyle/>
+          <a:p>
+            <a:r>
+              <a:rPr lang="en-US" sz="2800" dirty="0"/>
+              <a:t>Next Frame’s Particles</a:t>
+            </a:r>
+          </a:p>
+        </p:txBody>
+      </p:sp>
+      <p:sp>
+        <p:nvSpPr>
+          <p:cNvPr id="63" name="Rectangle 62">
+            <a:extLst>
+              <a:ext uri="{FF2B5EF4-FFF2-40B4-BE49-F238E27FC236}">
+                <a16:creationId xmlns:a16="http://schemas.microsoft.com/office/drawing/2014/main" id="{4FF92B16-A235-437B-B992-559C328ED6D0}"/>
+              </a:ext>
+            </a:extLst>
+          </p:cNvPr>
+          <p:cNvSpPr/>
+          <p:nvPr/>
+        </p:nvSpPr>
+        <p:spPr>
+          <a:xfrm>
+            <a:off x="3553792" y="3387716"/>
+            <a:ext cx="507868" cy="775355"/>
+          </a:xfrm>
+          <a:prstGeom prst="rect">
+            <a:avLst/>
+          </a:prstGeom>
+          <a:noFill/>
+          <a:ln w="38100">
+            <a:solidFill>
+              <a:srgbClr val="FFFF00"/>
+            </a:solidFill>
+          </a:ln>
+        </p:spPr>
+        <p:style>
+          <a:lnRef idx="2">
+            <a:schemeClr val="accent1">
+              <a:shade val="50000"/>
+            </a:schemeClr>
+          </a:lnRef>
+          <a:fillRef idx="1">
+            <a:schemeClr val="accent1"/>
+          </a:fillRef>
+          <a:effectRef idx="0">
+            <a:schemeClr val="accent1"/>
+          </a:effectRef>
+          <a:fontRef idx="minor">
+            <a:schemeClr val="lt1"/>
+          </a:fontRef>
+        </p:style>
+        <p:txBody>
+          <a:bodyPr rtlCol="0" anchor="ctr"/>
+          <a:lstStyle/>
+          <a:p>
+            <a:pPr algn="ctr"/>
+            <a:endParaRPr lang="en-US"/>
+          </a:p>
+        </p:txBody>
+      </p:sp>
+      <p:sp>
+        <p:nvSpPr>
+          <p:cNvPr id="64" name="Rectangle 63">
+            <a:extLst>
+              <a:ext uri="{FF2B5EF4-FFF2-40B4-BE49-F238E27FC236}">
+                <a16:creationId xmlns:a16="http://schemas.microsoft.com/office/drawing/2014/main" id="{5EB485ED-B952-42F8-9649-AACAD948663C}"/>
+              </a:ext>
+            </a:extLst>
+          </p:cNvPr>
+          <p:cNvSpPr/>
+          <p:nvPr/>
+        </p:nvSpPr>
+        <p:spPr>
+          <a:xfrm>
+            <a:off x="3781858" y="3603536"/>
+            <a:ext cx="507868" cy="1096259"/>
+          </a:xfrm>
+          <a:prstGeom prst="rect">
+            <a:avLst/>
+          </a:prstGeom>
+          <a:noFill/>
+          <a:ln w="76200"/>
+        </p:spPr>
+        <p:style>
+          <a:lnRef idx="2">
+            <a:schemeClr val="accent1">
+              <a:shade val="50000"/>
+            </a:schemeClr>
+          </a:lnRef>
+          <a:fillRef idx="1">
+            <a:schemeClr val="accent1"/>
+          </a:fillRef>
+          <a:effectRef idx="0">
+            <a:schemeClr val="accent1"/>
+          </a:effectRef>
+          <a:fontRef idx="minor">
+            <a:schemeClr val="lt1"/>
+          </a:fontRef>
+        </p:style>
+        <p:txBody>
+          <a:bodyPr rtlCol="0" anchor="ctr"/>
+          <a:lstStyle/>
+          <a:p>
+            <a:pPr algn="ctr"/>
+            <a:endParaRPr lang="en-US"/>
+          </a:p>
+        </p:txBody>
+      </p:sp>
+      <p:sp>
+        <p:nvSpPr>
+          <p:cNvPr id="65" name="Rectangle 64">
+            <a:extLst>
+              <a:ext uri="{FF2B5EF4-FFF2-40B4-BE49-F238E27FC236}">
+                <a16:creationId xmlns:a16="http://schemas.microsoft.com/office/drawing/2014/main" id="{ADEDE622-C52E-46EB-850B-7ABD11617FAE}"/>
+              </a:ext>
+            </a:extLst>
+          </p:cNvPr>
+          <p:cNvSpPr/>
+          <p:nvPr/>
+        </p:nvSpPr>
+        <p:spPr>
+          <a:xfrm>
+            <a:off x="3360476" y="4502094"/>
+            <a:ext cx="507868" cy="647642"/>
+          </a:xfrm>
+          <a:prstGeom prst="rect">
+            <a:avLst/>
+          </a:prstGeom>
+          <a:noFill/>
+          <a:ln w="28575">
+            <a:solidFill>
+              <a:schemeClr val="accent2">
+                <a:lumMod val="75000"/>
+              </a:schemeClr>
+            </a:solidFill>
+          </a:ln>
+        </p:spPr>
+        <p:style>
+          <a:lnRef idx="2">
+            <a:schemeClr val="accent1">
+              <a:shade val="50000"/>
+            </a:schemeClr>
+          </a:lnRef>
+          <a:fillRef idx="1">
+            <a:schemeClr val="accent1"/>
+          </a:fillRef>
+          <a:effectRef idx="0">
+            <a:schemeClr val="accent1"/>
+          </a:effectRef>
+          <a:fontRef idx="minor">
+            <a:schemeClr val="lt1"/>
+          </a:fontRef>
+        </p:style>
+        <p:txBody>
+          <a:bodyPr rtlCol="0" anchor="ctr"/>
+          <a:lstStyle/>
+          <a:p>
+            <a:pPr algn="ctr"/>
+            <a:endParaRPr lang="en-US" dirty="0"/>
+          </a:p>
+        </p:txBody>
+      </p:sp>
+      <p:cxnSp>
+        <p:nvCxnSpPr>
+          <p:cNvPr id="68" name="Straight Arrow Connector 67">
+            <a:extLst>
+              <a:ext uri="{FF2B5EF4-FFF2-40B4-BE49-F238E27FC236}">
+                <a16:creationId xmlns:a16="http://schemas.microsoft.com/office/drawing/2014/main" id="{6A2826BF-ADB8-426C-8C46-BFBE0446805D}"/>
+              </a:ext>
+            </a:extLst>
+          </p:cNvPr>
+          <p:cNvCxnSpPr>
+            <a:cxnSpLocks/>
+          </p:cNvCxnSpPr>
+          <p:nvPr/>
+        </p:nvCxnSpPr>
+        <p:spPr>
+          <a:xfrm flipH="1">
+            <a:off x="3356621" y="3775393"/>
+            <a:ext cx="404266" cy="161041"/>
+          </a:xfrm>
+          <a:prstGeom prst="straightConnector1">
+            <a:avLst/>
+          </a:prstGeom>
+          <a:ln w="28575">
+            <a:solidFill>
+              <a:srgbClr val="FFFF00"/>
+            </a:solidFill>
+            <a:tailEnd type="triangle"/>
+          </a:ln>
+        </p:spPr>
+        <p:style>
+          <a:lnRef idx="1">
+            <a:schemeClr val="accent1"/>
+          </a:lnRef>
+          <a:fillRef idx="0">
+            <a:schemeClr val="accent1"/>
+          </a:fillRef>
+          <a:effectRef idx="0">
+            <a:schemeClr val="accent1"/>
+          </a:effectRef>
+          <a:fontRef idx="minor">
+            <a:schemeClr val="tx1"/>
+          </a:fontRef>
+        </p:style>
+      </p:cxnSp>
+      <p:cxnSp>
+        <p:nvCxnSpPr>
+          <p:cNvPr id="69" name="Straight Arrow Connector 68">
+            <a:extLst>
+              <a:ext uri="{FF2B5EF4-FFF2-40B4-BE49-F238E27FC236}">
+                <a16:creationId xmlns:a16="http://schemas.microsoft.com/office/drawing/2014/main" id="{AA337681-E238-4542-8EC4-FBE3BAA8E2D8}"/>
+              </a:ext>
+            </a:extLst>
+          </p:cNvPr>
+          <p:cNvCxnSpPr>
+            <a:cxnSpLocks/>
+          </p:cNvCxnSpPr>
+          <p:nvPr/>
+        </p:nvCxnSpPr>
+        <p:spPr>
+          <a:xfrm flipH="1" flipV="1">
+            <a:off x="3521687" y="4230681"/>
+            <a:ext cx="456421" cy="42762"/>
+          </a:xfrm>
+          <a:prstGeom prst="straightConnector1">
+            <a:avLst/>
+          </a:prstGeom>
+          <a:ln w="28575">
+            <a:solidFill>
+              <a:srgbClr val="0070C0"/>
+            </a:solidFill>
+            <a:tailEnd type="triangle"/>
+          </a:ln>
+        </p:spPr>
+        <p:style>
+          <a:lnRef idx="1">
+            <a:schemeClr val="accent1"/>
+          </a:lnRef>
+          <a:fillRef idx="0">
+            <a:schemeClr val="accent1"/>
+          </a:fillRef>
+          <a:effectRef idx="0">
+            <a:schemeClr val="accent1"/>
+          </a:effectRef>
+          <a:fontRef idx="minor">
+            <a:schemeClr val="tx1"/>
+          </a:fontRef>
+        </p:style>
+      </p:cxnSp>
+      <p:cxnSp>
+        <p:nvCxnSpPr>
+          <p:cNvPr id="70" name="Straight Arrow Connector 69">
+            <a:extLst>
+              <a:ext uri="{FF2B5EF4-FFF2-40B4-BE49-F238E27FC236}">
+                <a16:creationId xmlns:a16="http://schemas.microsoft.com/office/drawing/2014/main" id="{67A1D36E-4CD0-4ABC-A1EF-E52767D798EC}"/>
+              </a:ext>
+            </a:extLst>
+          </p:cNvPr>
+          <p:cNvCxnSpPr>
+            <a:cxnSpLocks/>
+          </p:cNvCxnSpPr>
+          <p:nvPr/>
+        </p:nvCxnSpPr>
+        <p:spPr>
+          <a:xfrm flipH="1">
+            <a:off x="3452410" y="4825915"/>
+            <a:ext cx="185963" cy="108525"/>
+          </a:xfrm>
+          <a:prstGeom prst="straightConnector1">
+            <a:avLst/>
+          </a:prstGeom>
+          <a:ln w="28575">
+            <a:solidFill>
+              <a:schemeClr val="accent2">
+                <a:lumMod val="75000"/>
+              </a:schemeClr>
+            </a:solidFill>
+            <a:tailEnd type="triangle"/>
+          </a:ln>
+        </p:spPr>
+        <p:style>
+          <a:lnRef idx="1">
+            <a:schemeClr val="accent1"/>
+          </a:lnRef>
+          <a:fillRef idx="0">
+            <a:schemeClr val="accent1"/>
+          </a:fillRef>
+          <a:effectRef idx="0">
+            <a:schemeClr val="accent1"/>
+          </a:effectRef>
+          <a:fontRef idx="minor">
+            <a:schemeClr val="tx1"/>
+          </a:fontRef>
+        </p:style>
+      </p:cxnSp>
+      <p:sp>
+        <p:nvSpPr>
+          <p:cNvPr id="5" name="Rectangle 4">
+            <a:extLst>
+              <a:ext uri="{FF2B5EF4-FFF2-40B4-BE49-F238E27FC236}">
+                <a16:creationId xmlns:a16="http://schemas.microsoft.com/office/drawing/2014/main" id="{87A919C2-74E4-4BD4-B03F-C38978903326}"/>
+              </a:ext>
+            </a:extLst>
+          </p:cNvPr>
+          <p:cNvSpPr/>
+          <p:nvPr/>
+        </p:nvSpPr>
+        <p:spPr>
+          <a:xfrm>
+            <a:off x="9147980" y="3798080"/>
+            <a:ext cx="420813" cy="1191289"/>
+          </a:xfrm>
+          <a:prstGeom prst="rect">
+            <a:avLst/>
+          </a:prstGeom>
+          <a:noFill/>
+          <a:ln w="57150">
+            <a:solidFill>
+              <a:srgbClr val="00B050"/>
+            </a:solidFill>
+            <a:prstDash val="sysDot"/>
+          </a:ln>
+        </p:spPr>
+        <p:style>
+          <a:lnRef idx="2">
+            <a:schemeClr val="accent1">
+              <a:shade val="50000"/>
+            </a:schemeClr>
+          </a:lnRef>
+          <a:fillRef idx="1">
+            <a:schemeClr val="accent1"/>
+          </a:fillRef>
+          <a:effectRef idx="0">
+            <a:schemeClr val="accent1"/>
+          </a:effectRef>
+          <a:fontRef idx="minor">
+            <a:schemeClr val="lt1"/>
+          </a:fontRef>
+        </p:style>
+        <p:txBody>
+          <a:bodyPr rtlCol="0" anchor="ctr"/>
+          <a:lstStyle/>
+          <a:p>
+            <a:pPr algn="ctr"/>
+            <a:endParaRPr lang="en-US"/>
+          </a:p>
+        </p:txBody>
+      </p:sp>
+      <p:cxnSp>
+        <p:nvCxnSpPr>
+          <p:cNvPr id="9" name="Straight Arrow Connector 8">
+            <a:extLst>
+              <a:ext uri="{FF2B5EF4-FFF2-40B4-BE49-F238E27FC236}">
+                <a16:creationId xmlns:a16="http://schemas.microsoft.com/office/drawing/2014/main" id="{FC8E15B0-0A18-428B-B533-1D0268CB0849}"/>
+              </a:ext>
+            </a:extLst>
+          </p:cNvPr>
+          <p:cNvCxnSpPr>
+            <a:cxnSpLocks/>
+          </p:cNvCxnSpPr>
+          <p:nvPr/>
+        </p:nvCxnSpPr>
+        <p:spPr>
+          <a:xfrm flipV="1">
+            <a:off x="7785377" y="4393724"/>
+            <a:ext cx="1269880" cy="718763"/>
+          </a:xfrm>
+          <a:prstGeom prst="straightConnector1">
+            <a:avLst/>
+          </a:prstGeom>
+          <a:ln w="57150">
+            <a:solidFill>
+              <a:srgbClr val="00B050"/>
+            </a:solidFill>
+            <a:tailEnd type="triangle"/>
+          </a:ln>
+        </p:spPr>
+        <p:style>
+          <a:lnRef idx="1">
+            <a:schemeClr val="accent1"/>
+          </a:lnRef>
+          <a:fillRef idx="0">
+            <a:schemeClr val="accent1"/>
+          </a:fillRef>
+          <a:effectRef idx="0">
+            <a:schemeClr val="accent1"/>
+          </a:effectRef>
+          <a:fontRef idx="minor">
+            <a:schemeClr val="tx1"/>
+          </a:fontRef>
+        </p:style>
+      </p:cxnSp>
+      <p:sp>
+        <p:nvSpPr>
+          <p:cNvPr id="11" name="TextBox 10">
+            <a:extLst>
+              <a:ext uri="{FF2B5EF4-FFF2-40B4-BE49-F238E27FC236}">
+                <a16:creationId xmlns:a16="http://schemas.microsoft.com/office/drawing/2014/main" id="{22DD4F25-13AE-42A0-A93B-2F169905ADD6}"/>
+              </a:ext>
+            </a:extLst>
+          </p:cNvPr>
+          <p:cNvSpPr txBox="1"/>
+          <p:nvPr/>
+        </p:nvSpPr>
+        <p:spPr>
+          <a:xfrm>
+            <a:off x="7135994" y="5089299"/>
+            <a:ext cx="1545361" cy="646331"/>
+          </a:xfrm>
+          <a:prstGeom prst="rect">
+            <a:avLst/>
+          </a:prstGeom>
+          <a:noFill/>
+        </p:spPr>
+        <p:txBody>
+          <a:bodyPr wrap="square" rtlCol="0">
+            <a:spAutoFit/>
+          </a:bodyPr>
+          <a:lstStyle/>
+          <a:p>
+            <a:r>
+              <a:rPr lang="en-US" b="1" dirty="0">
+                <a:solidFill>
+                  <a:srgbClr val="00B050"/>
+                </a:solidFill>
+              </a:rPr>
+              <a:t>Weighted Average</a:t>
+            </a:r>
+          </a:p>
+        </p:txBody>
+      </p:sp>
+    </p:spTree>
+    <p:extLst>
+      <p:ext uri="{BB962C8B-B14F-4D97-AF65-F5344CB8AC3E}">
+        <p14:creationId xmlns:p14="http://schemas.microsoft.com/office/powerpoint/2010/main" val="725251168"/>
       </p:ext>
     </p:extLst>
   </p:cSld>
@@ -10839,6 +14134,357 @@
     <p:extLst>
       <p:ext uri="{BB962C8B-B14F-4D97-AF65-F5344CB8AC3E}">
         <p14:creationId xmlns:p14="http://schemas.microsoft.com/office/powerpoint/2010/main" val="63642957"/>
+      </p:ext>
+    </p:extLst>
+  </p:cSld>
+  <p:clrMapOvr>
+    <a:masterClrMapping/>
+  </p:clrMapOvr>
+</p:sld>
+</file>
+
+<file path=ppt/slides/slide20.xml><?xml version="1.0" encoding="utf-8"?>
+<p:sld xmlns:a="http://schemas.openxmlformats.org/drawingml/2006/main" xmlns:r="http://schemas.openxmlformats.org/officeDocument/2006/relationships" xmlns:p="http://schemas.openxmlformats.org/presentationml/2006/main">
+  <p:cSld>
+    <p:spTree>
+      <p:nvGrpSpPr>
+        <p:cNvPr id="1" name=""/>
+        <p:cNvGrpSpPr/>
+        <p:nvPr/>
+      </p:nvGrpSpPr>
+      <p:grpSpPr>
+        <a:xfrm>
+          <a:off x="0" y="0"/>
+          <a:ext cx="0" cy="0"/>
+          <a:chOff x="0" y="0"/>
+          <a:chExt cx="0" cy="0"/>
+        </a:xfrm>
+      </p:grpSpPr>
+      <p:sp>
+        <p:nvSpPr>
+          <p:cNvPr id="2" name="Date Placeholder 1">
+            <a:extLst>
+              <a:ext uri="{FF2B5EF4-FFF2-40B4-BE49-F238E27FC236}">
+                <a16:creationId xmlns:a16="http://schemas.microsoft.com/office/drawing/2014/main" id="{17F4FCC4-4604-40D1-9F16-F88324ED8F57}"/>
+              </a:ext>
+            </a:extLst>
+          </p:cNvPr>
+          <p:cNvSpPr>
+            <a:spLocks noGrp="1"/>
+          </p:cNvSpPr>
+          <p:nvPr>
+            <p:ph type="dt" sz="half" idx="10"/>
+          </p:nvPr>
+        </p:nvSpPr>
+        <p:spPr/>
+        <p:txBody>
+          <a:bodyPr/>
+          <a:lstStyle/>
+          <a:p>
+            <a:fld id="{F736EC4A-E5B7-42C2-9943-4D2477F0E2BA}" type="datetime1">
+              <a:rPr lang="en-US" smtClean="0"/>
+              <a:t>2/16/2022</a:t>
+            </a:fld>
+            <a:endParaRPr lang="en-US" dirty="0"/>
+          </a:p>
+        </p:txBody>
+      </p:sp>
+      <p:sp>
+        <p:nvSpPr>
+          <p:cNvPr id="3" name="Footer Placeholder 2">
+            <a:extLst>
+              <a:ext uri="{FF2B5EF4-FFF2-40B4-BE49-F238E27FC236}">
+                <a16:creationId xmlns:a16="http://schemas.microsoft.com/office/drawing/2014/main" id="{390ECFB5-D86A-493C-BE04-56C46A03F928}"/>
+              </a:ext>
+            </a:extLst>
+          </p:cNvPr>
+          <p:cNvSpPr>
+            <a:spLocks noGrp="1"/>
+          </p:cNvSpPr>
+          <p:nvPr>
+            <p:ph type="ftr" sz="quarter" idx="11"/>
+          </p:nvPr>
+        </p:nvSpPr>
+        <p:spPr/>
+        <p:txBody>
+          <a:bodyPr/>
+          <a:lstStyle/>
+          <a:p>
+            <a:r>
+              <a:rPr lang="en-US"/>
+              <a:t>Or Sagiv &amp; Etai Sella</a:t>
+            </a:r>
+            <a:endParaRPr lang="en-US" dirty="0"/>
+          </a:p>
+        </p:txBody>
+      </p:sp>
+      <p:sp>
+        <p:nvSpPr>
+          <p:cNvPr id="4" name="Slide Number Placeholder 3">
+            <a:extLst>
+              <a:ext uri="{FF2B5EF4-FFF2-40B4-BE49-F238E27FC236}">
+                <a16:creationId xmlns:a16="http://schemas.microsoft.com/office/drawing/2014/main" id="{34B1658B-2A38-4339-AD04-15960337C0A3}"/>
+              </a:ext>
+            </a:extLst>
+          </p:cNvPr>
+          <p:cNvSpPr>
+            <a:spLocks noGrp="1"/>
+          </p:cNvSpPr>
+          <p:nvPr>
+            <p:ph type="sldNum" sz="quarter" idx="12"/>
+          </p:nvPr>
+        </p:nvSpPr>
+        <p:spPr/>
+        <p:txBody>
+          <a:bodyPr/>
+          <a:lstStyle/>
+          <a:p>
+            <a:fld id="{C629165E-D59B-453D-B763-34340D7036F6}" type="slidenum">
+              <a:rPr lang="en-US" smtClean="0"/>
+              <a:t>20</a:t>
+            </a:fld>
+            <a:endParaRPr lang="en-US" dirty="0"/>
+          </a:p>
+        </p:txBody>
+      </p:sp>
+      <p:sp>
+        <p:nvSpPr>
+          <p:cNvPr id="5" name="Content Placeholder 4">
+            <a:extLst>
+              <a:ext uri="{FF2B5EF4-FFF2-40B4-BE49-F238E27FC236}">
+                <a16:creationId xmlns:a16="http://schemas.microsoft.com/office/drawing/2014/main" id="{D692A99E-EB4E-41A4-A607-9B3A99A7979C}"/>
+              </a:ext>
+            </a:extLst>
+          </p:cNvPr>
+          <p:cNvSpPr>
+            <a:spLocks noGrp="1"/>
+          </p:cNvSpPr>
+          <p:nvPr>
+            <p:ph idx="1"/>
+          </p:nvPr>
+        </p:nvSpPr>
+        <p:spPr/>
+        <p:txBody>
+          <a:bodyPr>
+            <a:normAutofit lnSpcReduction="10000"/>
+          </a:bodyPr>
+          <a:lstStyle/>
+          <a:p>
+            <a:r>
+              <a:rPr lang="en-US" dirty="0"/>
+              <a:t>The location in the first Frame is used as ground truth</a:t>
+            </a:r>
+          </a:p>
+          <a:p>
+            <a:endParaRPr lang="en-US" dirty="0"/>
+          </a:p>
+          <a:p>
+            <a:r>
+              <a:rPr lang="en-US" dirty="0"/>
+              <a:t>After a few frames, the target might not resemble its appearance in the first frame, for example if it moved Infront of a new background</a:t>
+            </a:r>
+          </a:p>
+          <a:p>
+            <a:endParaRPr lang="en-US" dirty="0"/>
+          </a:p>
+          <a:p>
+            <a:r>
+              <a:rPr lang="en-US" dirty="0"/>
+              <a:t>Thus, we update the ground truth every few frames.</a:t>
+            </a:r>
+          </a:p>
+          <a:p>
+            <a:endParaRPr lang="en-US" dirty="0"/>
+          </a:p>
+          <a:p>
+            <a:r>
+              <a:rPr lang="en-US" dirty="0"/>
+              <a:t>In order to stay close to the  </a:t>
+            </a:r>
+          </a:p>
+          <a:p>
+            <a:endParaRPr lang="en-US" dirty="0"/>
+          </a:p>
+        </p:txBody>
+      </p:sp>
+      <p:sp>
+        <p:nvSpPr>
+          <p:cNvPr id="6" name="Title 5">
+            <a:extLst>
+              <a:ext uri="{FF2B5EF4-FFF2-40B4-BE49-F238E27FC236}">
+                <a16:creationId xmlns:a16="http://schemas.microsoft.com/office/drawing/2014/main" id="{E9E4C79A-08FA-4D88-949A-AE7B6340D376}"/>
+              </a:ext>
+            </a:extLst>
+          </p:cNvPr>
+          <p:cNvSpPr>
+            <a:spLocks noGrp="1"/>
+          </p:cNvSpPr>
+          <p:nvPr>
+            <p:ph type="title"/>
+          </p:nvPr>
+        </p:nvSpPr>
+        <p:spPr/>
+        <p:txBody>
+          <a:bodyPr/>
+          <a:lstStyle/>
+          <a:p>
+            <a:r>
+              <a:rPr lang="en-US" dirty="0"/>
+              <a:t>State Update</a:t>
+            </a:r>
+          </a:p>
+        </p:txBody>
+      </p:sp>
+    </p:spTree>
+    <p:extLst>
+      <p:ext uri="{BB962C8B-B14F-4D97-AF65-F5344CB8AC3E}">
+        <p14:creationId xmlns:p14="http://schemas.microsoft.com/office/powerpoint/2010/main" val="658919948"/>
+      </p:ext>
+    </p:extLst>
+  </p:cSld>
+  <p:clrMapOvr>
+    <a:masterClrMapping/>
+  </p:clrMapOvr>
+</p:sld>
+</file>
+
+<file path=ppt/slides/slide21.xml><?xml version="1.0" encoding="utf-8"?>
+<p:sld xmlns:a="http://schemas.openxmlformats.org/drawingml/2006/main" xmlns:r="http://schemas.openxmlformats.org/officeDocument/2006/relationships" xmlns:p="http://schemas.openxmlformats.org/presentationml/2006/main">
+  <p:cSld>
+    <p:spTree>
+      <p:nvGrpSpPr>
+        <p:cNvPr id="1" name=""/>
+        <p:cNvGrpSpPr/>
+        <p:nvPr/>
+      </p:nvGrpSpPr>
+      <p:grpSpPr>
+        <a:xfrm>
+          <a:off x="0" y="0"/>
+          <a:ext cx="0" cy="0"/>
+          <a:chOff x="0" y="0"/>
+          <a:chExt cx="0" cy="0"/>
+        </a:xfrm>
+      </p:grpSpPr>
+      <p:sp>
+        <p:nvSpPr>
+          <p:cNvPr id="2" name="Title 1">
+            <a:extLst>
+              <a:ext uri="{FF2B5EF4-FFF2-40B4-BE49-F238E27FC236}">
+                <a16:creationId xmlns:a16="http://schemas.microsoft.com/office/drawing/2014/main" id="{143B5247-4B5C-44D2-AE13-25DD403557B4}"/>
+              </a:ext>
+            </a:extLst>
+          </p:cNvPr>
+          <p:cNvSpPr>
+            <a:spLocks noGrp="1"/>
+          </p:cNvSpPr>
+          <p:nvPr>
+            <p:ph type="title"/>
+          </p:nvPr>
+        </p:nvSpPr>
+        <p:spPr/>
+        <p:txBody>
+          <a:bodyPr>
+            <a:normAutofit/>
+          </a:bodyPr>
+          <a:lstStyle/>
+          <a:p>
+            <a:r>
+              <a:rPr lang="en-US" dirty="0"/>
+              <a:t>Questions?</a:t>
+            </a:r>
+          </a:p>
+        </p:txBody>
+      </p:sp>
+      <p:sp>
+        <p:nvSpPr>
+          <p:cNvPr id="4" name="Date Placeholder 3">
+            <a:extLst>
+              <a:ext uri="{FF2B5EF4-FFF2-40B4-BE49-F238E27FC236}">
+                <a16:creationId xmlns:a16="http://schemas.microsoft.com/office/drawing/2014/main" id="{59913B85-3B4F-43D3-A7E9-D06F5E37C6C1}"/>
+              </a:ext>
+            </a:extLst>
+          </p:cNvPr>
+          <p:cNvSpPr>
+            <a:spLocks noGrp="1"/>
+          </p:cNvSpPr>
+          <p:nvPr>
+            <p:ph type="dt" sz="half" idx="10"/>
+          </p:nvPr>
+        </p:nvSpPr>
+        <p:spPr/>
+        <p:txBody>
+          <a:bodyPr/>
+          <a:lstStyle/>
+          <a:p>
+            <a:fld id="{F736EC4A-E5B7-42C2-9943-4D2477F0E2BA}" type="datetime1">
+              <a:rPr lang="en-US" smtClean="0"/>
+              <a:t>2/16/2022</a:t>
+            </a:fld>
+            <a:endParaRPr lang="en-US" dirty="0"/>
+          </a:p>
+        </p:txBody>
+      </p:sp>
+      <p:sp>
+        <p:nvSpPr>
+          <p:cNvPr id="5" name="Footer Placeholder 4">
+            <a:extLst>
+              <a:ext uri="{FF2B5EF4-FFF2-40B4-BE49-F238E27FC236}">
+                <a16:creationId xmlns:a16="http://schemas.microsoft.com/office/drawing/2014/main" id="{C5649577-8229-4DC9-AE82-59C3A5BA0515}"/>
+              </a:ext>
+            </a:extLst>
+          </p:cNvPr>
+          <p:cNvSpPr>
+            <a:spLocks noGrp="1"/>
+          </p:cNvSpPr>
+          <p:nvPr>
+            <p:ph type="ftr" sz="quarter" idx="11"/>
+          </p:nvPr>
+        </p:nvSpPr>
+        <p:spPr/>
+        <p:txBody>
+          <a:bodyPr/>
+          <a:lstStyle/>
+          <a:p>
+            <a:r>
+              <a:rPr lang="en-US" dirty="0"/>
+              <a:t>Or Sagiv &amp; Etai Sella</a:t>
+            </a:r>
+          </a:p>
+        </p:txBody>
+      </p:sp>
+      <p:sp>
+        <p:nvSpPr>
+          <p:cNvPr id="6" name="Slide Number Placeholder 5">
+            <a:extLst>
+              <a:ext uri="{FF2B5EF4-FFF2-40B4-BE49-F238E27FC236}">
+                <a16:creationId xmlns:a16="http://schemas.microsoft.com/office/drawing/2014/main" id="{1B57282B-C25D-48B2-A667-C1D467EB1137}"/>
+              </a:ext>
+            </a:extLst>
+          </p:cNvPr>
+          <p:cNvSpPr>
+            <a:spLocks noGrp="1"/>
+          </p:cNvSpPr>
+          <p:nvPr>
+            <p:ph type="sldNum" sz="quarter" idx="12"/>
+          </p:nvPr>
+        </p:nvSpPr>
+        <p:spPr/>
+        <p:txBody>
+          <a:bodyPr/>
+          <a:lstStyle/>
+          <a:p>
+            <a:fld id="{C629165E-D59B-453D-B763-34340D7036F6}" type="slidenum">
+              <a:rPr lang="en-US" smtClean="0"/>
+              <a:t>21</a:t>
+            </a:fld>
+            <a:endParaRPr lang="en-US" dirty="0"/>
+          </a:p>
+        </p:txBody>
+      </p:sp>
+    </p:spTree>
+    <p:extLst>
+      <p:ext uri="{BB962C8B-B14F-4D97-AF65-F5344CB8AC3E}">
+        <p14:creationId xmlns:p14="http://schemas.microsoft.com/office/powerpoint/2010/main" val="3084981542"/>
       </p:ext>
     </p:extLst>
   </p:cSld>
@@ -12518,7 +16164,7 @@
           <p:cNvPr id="2" name="Title 1">
             <a:extLst>
               <a:ext uri="{FF2B5EF4-FFF2-40B4-BE49-F238E27FC236}">
-                <a16:creationId xmlns:a16="http://schemas.microsoft.com/office/drawing/2014/main" id="{143B5247-4B5C-44D2-AE13-25DD403557B4}"/>
+                <a16:creationId xmlns:a16="http://schemas.microsoft.com/office/drawing/2014/main" id="{AB41612C-CDF9-4105-A76A-E0AC444F5641}"/>
               </a:ext>
             </a:extLst>
           </p:cNvPr>
@@ -12538,8 +16184,85 @@
           <a:p>
             <a:r>
               <a:rPr lang="en-US" dirty="0"/>
-              <a:t>Questions?</a:t>
-            </a:r>
+              <a:t>Background and Motivation – Tracking</a:t>
+            </a:r>
+          </a:p>
+        </p:txBody>
+      </p:sp>
+      <p:sp>
+        <p:nvSpPr>
+          <p:cNvPr id="3" name="Content Placeholder 2">
+            <a:extLst>
+              <a:ext uri="{FF2B5EF4-FFF2-40B4-BE49-F238E27FC236}">
+                <a16:creationId xmlns:a16="http://schemas.microsoft.com/office/drawing/2014/main" id="{A470BF20-1EA3-41E8-9E42-65E12E31A1AA}"/>
+              </a:ext>
+            </a:extLst>
+          </p:cNvPr>
+          <p:cNvSpPr>
+            <a:spLocks noGrp="1"/>
+          </p:cNvSpPr>
+          <p:nvPr>
+            <p:ph idx="1"/>
+          </p:nvPr>
+        </p:nvSpPr>
+        <p:spPr/>
+        <p:txBody>
+          <a:bodyPr/>
+          <a:lstStyle/>
+          <a:p>
+            <a:r>
+              <a:rPr lang="en-US" dirty="0"/>
+              <a:t>This method produces good results, however:</a:t>
+            </a:r>
+          </a:p>
+          <a:p>
+            <a:endParaRPr lang="en-US" dirty="0"/>
+          </a:p>
+          <a:p>
+            <a:pPr lvl="1"/>
+            <a:r>
+              <a:rPr lang="en-US" dirty="0"/>
+              <a:t>It still has limited precision</a:t>
+            </a:r>
+          </a:p>
+          <a:p>
+            <a:pPr lvl="1"/>
+            <a:endParaRPr lang="en-US" dirty="0"/>
+          </a:p>
+          <a:p>
+            <a:pPr lvl="1"/>
+            <a:r>
+              <a:rPr lang="en-US" dirty="0"/>
+              <a:t>The refining stage, as good as it may be, can only be used as part of its original tracker – it lacks </a:t>
+            </a:r>
+            <a:r>
+              <a:rPr lang="en-US" i="1" dirty="0"/>
+              <a:t>transferability</a:t>
+            </a:r>
+          </a:p>
+          <a:p>
+            <a:endParaRPr lang="en-US" dirty="0"/>
+          </a:p>
+          <a:p>
+            <a:r>
+              <a:rPr lang="en-US" dirty="0"/>
+              <a:t>For these reasons, Bin Yan et al proposed a novel method of refining tracker results called - </a:t>
+            </a:r>
+            <a:r>
+              <a:rPr lang="en-US" i="1" dirty="0"/>
+              <a:t>AlphaRefine.</a:t>
+            </a:r>
+          </a:p>
+          <a:p>
+            <a:endParaRPr lang="en-US" dirty="0"/>
+          </a:p>
+          <a:p>
+            <a:pPr lvl="1"/>
+            <a:endParaRPr lang="en-US" b="1" dirty="0"/>
+          </a:p>
+          <a:p>
+            <a:pPr lvl="1"/>
+            <a:endParaRPr lang="en-US" dirty="0"/>
           </a:p>
         </p:txBody>
       </p:sp>
@@ -12548,7 +16271,7 @@
           <p:cNvPr id="4" name="Date Placeholder 3">
             <a:extLst>
               <a:ext uri="{FF2B5EF4-FFF2-40B4-BE49-F238E27FC236}">
-                <a16:creationId xmlns:a16="http://schemas.microsoft.com/office/drawing/2014/main" id="{59913B85-3B4F-43D3-A7E9-D06F5E37C6C1}"/>
+                <a16:creationId xmlns:a16="http://schemas.microsoft.com/office/drawing/2014/main" id="{49F36727-99BC-4C5B-AAE3-B13AA9C619DD}"/>
               </a:ext>
             </a:extLst>
           </p:cNvPr>
@@ -12577,7 +16300,7 @@
           <p:cNvPr id="5" name="Footer Placeholder 4">
             <a:extLst>
               <a:ext uri="{FF2B5EF4-FFF2-40B4-BE49-F238E27FC236}">
-                <a16:creationId xmlns:a16="http://schemas.microsoft.com/office/drawing/2014/main" id="{C5649577-8229-4DC9-AE82-59C3A5BA0515}"/>
+                <a16:creationId xmlns:a16="http://schemas.microsoft.com/office/drawing/2014/main" id="{33CF2F71-992C-4D6D-94ED-BA14A60B0C74}"/>
               </a:ext>
             </a:extLst>
           </p:cNvPr>
@@ -12605,7 +16328,7 @@
           <p:cNvPr id="6" name="Slide Number Placeholder 5">
             <a:extLst>
               <a:ext uri="{FF2B5EF4-FFF2-40B4-BE49-F238E27FC236}">
-                <a16:creationId xmlns:a16="http://schemas.microsoft.com/office/drawing/2014/main" id="{1B57282B-C25D-48B2-A667-C1D467EB1137}"/>
+                <a16:creationId xmlns:a16="http://schemas.microsoft.com/office/drawing/2014/main" id="{1E169B89-C40B-43EE-B5FA-F08E04F40685}"/>
               </a:ext>
             </a:extLst>
           </p:cNvPr>
@@ -12632,7 +16355,7 @@
     </p:spTree>
     <p:extLst>
       <p:ext uri="{BB962C8B-B14F-4D97-AF65-F5344CB8AC3E}">
-        <p14:creationId xmlns:p14="http://schemas.microsoft.com/office/powerpoint/2010/main" val="2088741019"/>
+        <p14:creationId xmlns:p14="http://schemas.microsoft.com/office/powerpoint/2010/main" val="1162494772"/>
       </p:ext>
     </p:extLst>
   </p:cSld>

</xml_diff>